<commit_message>
Finish making changes after adding in restricted weight section
</commit_message>
<xml_diff>
--- a/final_report/images/graphs.pptx
+++ b/final_report/images/graphs.pptx
@@ -209,7 +209,7 @@
           <a:p>
             <a:fld id="{5ADE0F42-1EB1-C14E-B881-EB65E9D225AC}" type="datetimeFigureOut">
               <a:rPr lang="en-US" smtClean="0"/>
-              <a:t>4/4/19</a:t>
+              <a:t>4/6/19</a:t>
             </a:fld>
             <a:endParaRPr lang="en-US"/>
           </a:p>
@@ -1818,7 +1818,7 @@
           <a:p>
             <a:fld id="{75DCEA96-0148-464D-8045-BBEB0C835C6A}" type="datetimeFigureOut">
               <a:rPr lang="en-US" smtClean="0"/>
-              <a:t>4/4/19</a:t>
+              <a:t>4/6/19</a:t>
             </a:fld>
             <a:endParaRPr lang="en-US"/>
           </a:p>
@@ -1983,7 +1983,7 @@
           <a:p>
             <a:fld id="{75DCEA96-0148-464D-8045-BBEB0C835C6A}" type="datetimeFigureOut">
               <a:rPr lang="en-US" smtClean="0"/>
-              <a:t>4/4/19</a:t>
+              <a:t>4/6/19</a:t>
             </a:fld>
             <a:endParaRPr lang="en-US"/>
           </a:p>
@@ -2158,7 +2158,7 @@
           <a:p>
             <a:fld id="{75DCEA96-0148-464D-8045-BBEB0C835C6A}" type="datetimeFigureOut">
               <a:rPr lang="en-US" smtClean="0"/>
-              <a:t>4/4/19</a:t>
+              <a:t>4/6/19</a:t>
             </a:fld>
             <a:endParaRPr lang="en-US"/>
           </a:p>
@@ -2323,7 +2323,7 @@
           <a:p>
             <a:fld id="{75DCEA96-0148-464D-8045-BBEB0C835C6A}" type="datetimeFigureOut">
               <a:rPr lang="en-US" smtClean="0"/>
-              <a:t>4/4/19</a:t>
+              <a:t>4/6/19</a:t>
             </a:fld>
             <a:endParaRPr lang="en-US"/>
           </a:p>
@@ -2564,7 +2564,7 @@
           <a:p>
             <a:fld id="{75DCEA96-0148-464D-8045-BBEB0C835C6A}" type="datetimeFigureOut">
               <a:rPr lang="en-US" smtClean="0"/>
-              <a:t>4/4/19</a:t>
+              <a:t>4/6/19</a:t>
             </a:fld>
             <a:endParaRPr lang="en-US"/>
           </a:p>
@@ -2791,7 +2791,7 @@
           <a:p>
             <a:fld id="{75DCEA96-0148-464D-8045-BBEB0C835C6A}" type="datetimeFigureOut">
               <a:rPr lang="en-US" smtClean="0"/>
-              <a:t>4/4/19</a:t>
+              <a:t>4/6/19</a:t>
             </a:fld>
             <a:endParaRPr lang="en-US"/>
           </a:p>
@@ -3153,7 +3153,7 @@
           <a:p>
             <a:fld id="{75DCEA96-0148-464D-8045-BBEB0C835C6A}" type="datetimeFigureOut">
               <a:rPr lang="en-US" smtClean="0"/>
-              <a:t>4/4/19</a:t>
+              <a:t>4/6/19</a:t>
             </a:fld>
             <a:endParaRPr lang="en-US"/>
           </a:p>
@@ -3266,7 +3266,7 @@
           <a:p>
             <a:fld id="{75DCEA96-0148-464D-8045-BBEB0C835C6A}" type="datetimeFigureOut">
               <a:rPr lang="en-US" smtClean="0"/>
-              <a:t>4/4/19</a:t>
+              <a:t>4/6/19</a:t>
             </a:fld>
             <a:endParaRPr lang="en-US"/>
           </a:p>
@@ -3356,7 +3356,7 @@
           <a:p>
             <a:fld id="{75DCEA96-0148-464D-8045-BBEB0C835C6A}" type="datetimeFigureOut">
               <a:rPr lang="en-US" smtClean="0"/>
-              <a:t>4/4/19</a:t>
+              <a:t>4/6/19</a:t>
             </a:fld>
             <a:endParaRPr lang="en-US"/>
           </a:p>
@@ -3628,7 +3628,7 @@
           <a:p>
             <a:fld id="{75DCEA96-0148-464D-8045-BBEB0C835C6A}" type="datetimeFigureOut">
               <a:rPr lang="en-US" smtClean="0"/>
-              <a:t>4/4/19</a:t>
+              <a:t>4/6/19</a:t>
             </a:fld>
             <a:endParaRPr lang="en-US"/>
           </a:p>
@@ -3880,7 +3880,7 @@
           <a:p>
             <a:fld id="{75DCEA96-0148-464D-8045-BBEB0C835C6A}" type="datetimeFigureOut">
               <a:rPr lang="en-US" smtClean="0"/>
-              <a:t>4/4/19</a:t>
+              <a:t>4/6/19</a:t>
             </a:fld>
             <a:endParaRPr lang="en-US"/>
           </a:p>
@@ -4088,7 +4088,7 @@
           <a:p>
             <a:fld id="{75DCEA96-0148-464D-8045-BBEB0C835C6A}" type="datetimeFigureOut">
               <a:rPr lang="en-US" smtClean="0"/>
-              <a:t>4/4/19</a:t>
+              <a:t>4/6/19</a:t>
             </a:fld>
             <a:endParaRPr lang="en-US"/>
           </a:p>
@@ -10222,6 +10222,96 @@
             <p:spPr>
               <a:xfrm>
                 <a:off x="519937" y="3547076"/>
+                <a:ext cx="351763" cy="338554"/>
+              </a:xfrm>
+              <a:prstGeom prst="rect">
+                <a:avLst/>
+              </a:prstGeom>
+              <a:noFill/>
+            </p:spPr>
+            <p:txBody>
+              <a:bodyPr wrap="none" rtlCol="0">
+                <a:spAutoFit/>
+              </a:bodyPr>
+              <a:lstStyle/>
+              <a:p>
+                <a:pPr/>
+                <a14:m>
+                  <m:oMathPara xmlns:m="http://schemas.openxmlformats.org/officeDocument/2006/math">
+                    <m:oMathParaPr>
+                      <m:jc m:val="centerGroup"/>
+                    </m:oMathParaPr>
+                    <m:oMath xmlns:m="http://schemas.openxmlformats.org/officeDocument/2006/math">
+                      <m:r>
+                        <a:rPr lang="en-US" sz="1600" b="0" i="1" smtClean="0">
+                          <a:latin typeface="Cambria Math" charset="0"/>
+                          <a:ea typeface="Cambria Math" charset="0"/>
+                          <a:cs typeface="Cambria Math" charset="0"/>
+                        </a:rPr>
+                        <m:t>𝑢</m:t>
+                      </m:r>
+                    </m:oMath>
+                  </m:oMathPara>
+                </a14:m>
+                <a:endParaRPr lang="en-US" sz="1600" i="1" dirty="0">
+                  <a:latin typeface="Cambria Math" charset="0"/>
+                  <a:ea typeface="Cambria Math" charset="0"/>
+                  <a:cs typeface="Cambria Math" charset="0"/>
+                </a:endParaRPr>
+              </a:p>
+            </p:txBody>
+          </p:sp>
+        </mc:Choice>
+        <mc:Fallback>
+          <p:sp>
+            <p:nvSpPr>
+              <p:cNvPr id="173" name="TextBox 172"/>
+              <p:cNvSpPr txBox="1">
+                <a:spLocks noRot="1" noChangeAspect="1" noMove="1" noResize="1" noEditPoints="1" noAdjustHandles="1" noChangeArrowheads="1" noChangeShapeType="1" noTextEdit="1"/>
+              </p:cNvSpPr>
+              <p:nvPr/>
+            </p:nvSpPr>
+            <p:spPr>
+              <a:xfrm>
+                <a:off x="519937" y="3547076"/>
+                <a:ext cx="351763" cy="338554"/>
+              </a:xfrm>
+              <a:prstGeom prst="rect">
+                <a:avLst/>
+              </a:prstGeom>
+              <a:blipFill rotWithShape="0">
+                <a:blip r:embed="rId3"/>
+                <a:stretch>
+                  <a:fillRect/>
+                </a:stretch>
+              </a:blipFill>
+            </p:spPr>
+            <p:txBody>
+              <a:bodyPr/>
+              <a:lstStyle/>
+              <a:p>
+                <a:r>
+                  <a:rPr lang="en-US">
+                    <a:noFill/>
+                  </a:rPr>
+                  <a:t> </a:t>
+                </a:r>
+              </a:p>
+            </p:txBody>
+          </p:sp>
+        </mc:Fallback>
+      </mc:AlternateContent>
+      <mc:AlternateContent xmlns:mc="http://schemas.openxmlformats.org/markup-compatibility/2006">
+        <mc:Choice xmlns:a14="http://schemas.microsoft.com/office/drawing/2010/main" Requires="a14">
+          <p:sp>
+            <p:nvSpPr>
+              <p:cNvPr id="215" name="TextBox 214"/>
+              <p:cNvSpPr txBox="1"/>
+              <p:nvPr/>
+            </p:nvSpPr>
+            <p:spPr>
+              <a:xfrm>
+                <a:off x="697737" y="2899376"/>
                 <a:ext cx="347788" cy="338554"/>
               </a:xfrm>
               <a:prstGeom prst="rect">
@@ -10265,7 +10355,7 @@
         <mc:Fallback>
           <p:sp>
             <p:nvSpPr>
-              <p:cNvPr id="173" name="TextBox 172"/>
+              <p:cNvPr id="215" name="TextBox 214"/>
               <p:cNvSpPr txBox="1">
                 <a:spLocks noRot="1" noChangeAspect="1" noMove="1" noResize="1" noEditPoints="1" noAdjustHandles="1" noChangeArrowheads="1" noChangeShapeType="1" noTextEdit="1"/>
               </p:cNvSpPr>
@@ -10273,14 +10363,14 @@
             </p:nvSpPr>
             <p:spPr>
               <a:xfrm>
-                <a:off x="519937" y="3547076"/>
+                <a:off x="697737" y="2899376"/>
                 <a:ext cx="347788" cy="338554"/>
               </a:xfrm>
               <a:prstGeom prst="rect">
                 <a:avLst/>
               </a:prstGeom>
               <a:blipFill rotWithShape="0">
-                <a:blip r:embed="rId3"/>
+                <a:blip r:embed="rId4"/>
                 <a:stretch>
                   <a:fillRect/>
                 </a:stretch>
@@ -10301,17 +10391,63 @@
           </p:sp>
         </mc:Fallback>
       </mc:AlternateContent>
+      <p:sp>
+        <p:nvSpPr>
+          <p:cNvPr id="258" name="Rectangle 257"/>
+          <p:cNvSpPr/>
+          <p:nvPr/>
+        </p:nvSpPr>
+        <p:spPr>
+          <a:xfrm>
+            <a:off x="6542227" y="2379886"/>
+            <a:ext cx="145774" cy="145774"/>
+          </a:xfrm>
+          <a:prstGeom prst="rect">
+            <a:avLst/>
+          </a:prstGeom>
+          <a:noFill/>
+          <a:ln>
+            <a:solidFill>
+              <a:schemeClr val="tx1"/>
+            </a:solidFill>
+          </a:ln>
+        </p:spPr>
+        <p:style>
+          <a:lnRef idx="2">
+            <a:schemeClr val="accent1">
+              <a:shade val="50000"/>
+            </a:schemeClr>
+          </a:lnRef>
+          <a:fillRef idx="1">
+            <a:schemeClr val="accent1"/>
+          </a:fillRef>
+          <a:effectRef idx="0">
+            <a:schemeClr val="accent1"/>
+          </a:effectRef>
+          <a:fontRef idx="minor">
+            <a:schemeClr val="lt1"/>
+          </a:fontRef>
+        </p:style>
+        <p:txBody>
+          <a:bodyPr rtlCol="0" anchor="ctr"/>
+          <a:lstStyle/>
+          <a:p>
+            <a:pPr algn="ctr"/>
+            <a:endParaRPr lang="en-US"/>
+          </a:p>
+        </p:txBody>
+      </p:sp>
       <mc:AlternateContent xmlns:mc="http://schemas.openxmlformats.org/markup-compatibility/2006">
         <mc:Choice xmlns:a14="http://schemas.microsoft.com/office/drawing/2010/main" Requires="a14">
           <p:sp>
             <p:nvSpPr>
-              <p:cNvPr id="215" name="TextBox 214"/>
+              <p:cNvPr id="259" name="TextBox 258"/>
               <p:cNvSpPr txBox="1"/>
               <p:nvPr/>
             </p:nvSpPr>
             <p:spPr>
               <a:xfrm>
-                <a:off x="697737" y="2899376"/>
+                <a:off x="6688001" y="2268390"/>
                 <a:ext cx="387862" cy="338554"/>
               </a:xfrm>
               <a:prstGeom prst="rect">
@@ -10355,142 +10491,6 @@
         <mc:Fallback>
           <p:sp>
             <p:nvSpPr>
-              <p:cNvPr id="215" name="TextBox 214"/>
-              <p:cNvSpPr txBox="1">
-                <a:spLocks noRot="1" noChangeAspect="1" noMove="1" noResize="1" noEditPoints="1" noAdjustHandles="1" noChangeArrowheads="1" noChangeShapeType="1" noTextEdit="1"/>
-              </p:cNvSpPr>
-              <p:nvPr/>
-            </p:nvSpPr>
-            <p:spPr>
-              <a:xfrm>
-                <a:off x="697737" y="2899376"/>
-                <a:ext cx="387862" cy="338554"/>
-              </a:xfrm>
-              <a:prstGeom prst="rect">
-                <a:avLst/>
-              </a:prstGeom>
-              <a:blipFill rotWithShape="0">
-                <a:blip r:embed="rId4"/>
-                <a:stretch>
-                  <a:fillRect/>
-                </a:stretch>
-              </a:blipFill>
-            </p:spPr>
-            <p:txBody>
-              <a:bodyPr/>
-              <a:lstStyle/>
-              <a:p>
-                <a:r>
-                  <a:rPr lang="en-US">
-                    <a:noFill/>
-                  </a:rPr>
-                  <a:t> </a:t>
-                </a:r>
-              </a:p>
-            </p:txBody>
-          </p:sp>
-        </mc:Fallback>
-      </mc:AlternateContent>
-      <p:sp>
-        <p:nvSpPr>
-          <p:cNvPr id="258" name="Rectangle 257"/>
-          <p:cNvSpPr/>
-          <p:nvPr/>
-        </p:nvSpPr>
-        <p:spPr>
-          <a:xfrm>
-            <a:off x="6542227" y="2379886"/>
-            <a:ext cx="145774" cy="145774"/>
-          </a:xfrm>
-          <a:prstGeom prst="rect">
-            <a:avLst/>
-          </a:prstGeom>
-          <a:noFill/>
-          <a:ln>
-            <a:solidFill>
-              <a:schemeClr val="tx1"/>
-            </a:solidFill>
-          </a:ln>
-        </p:spPr>
-        <p:style>
-          <a:lnRef idx="2">
-            <a:schemeClr val="accent1">
-              <a:shade val="50000"/>
-            </a:schemeClr>
-          </a:lnRef>
-          <a:fillRef idx="1">
-            <a:schemeClr val="accent1"/>
-          </a:fillRef>
-          <a:effectRef idx="0">
-            <a:schemeClr val="accent1"/>
-          </a:effectRef>
-          <a:fontRef idx="minor">
-            <a:schemeClr val="lt1"/>
-          </a:fontRef>
-        </p:style>
-        <p:txBody>
-          <a:bodyPr rtlCol="0" anchor="ctr"/>
-          <a:lstStyle/>
-          <a:p>
-            <a:pPr algn="ctr"/>
-            <a:endParaRPr lang="en-US"/>
-          </a:p>
-        </p:txBody>
-      </p:sp>
-      <mc:AlternateContent xmlns:mc="http://schemas.openxmlformats.org/markup-compatibility/2006">
-        <mc:Choice xmlns:a14="http://schemas.microsoft.com/office/drawing/2010/main" Requires="a14">
-          <p:sp>
-            <p:nvSpPr>
-              <p:cNvPr id="259" name="TextBox 258"/>
-              <p:cNvSpPr txBox="1"/>
-              <p:nvPr/>
-            </p:nvSpPr>
-            <p:spPr>
-              <a:xfrm>
-                <a:off x="6688001" y="2268390"/>
-                <a:ext cx="351763" cy="338554"/>
-              </a:xfrm>
-              <a:prstGeom prst="rect">
-                <a:avLst/>
-              </a:prstGeom>
-              <a:noFill/>
-            </p:spPr>
-            <p:txBody>
-              <a:bodyPr wrap="none" rtlCol="0">
-                <a:spAutoFit/>
-              </a:bodyPr>
-              <a:lstStyle/>
-              <a:p>
-                <a:pPr/>
-                <a14:m>
-                  <m:oMathPara xmlns:m="http://schemas.openxmlformats.org/officeDocument/2006/math">
-                    <m:oMathParaPr>
-                      <m:jc m:val="centerGroup"/>
-                    </m:oMathParaPr>
-                    <m:oMath xmlns:m="http://schemas.openxmlformats.org/officeDocument/2006/math">
-                      <m:r>
-                        <a:rPr lang="en-US" sz="1600" b="0" i="1" smtClean="0">
-                          <a:latin typeface="Cambria Math" charset="0"/>
-                          <a:ea typeface="Cambria Math" charset="0"/>
-                          <a:cs typeface="Cambria Math" charset="0"/>
-                        </a:rPr>
-                        <m:t>𝑢</m:t>
-                      </m:r>
-                    </m:oMath>
-                  </m:oMathPara>
-                </a14:m>
-                <a:endParaRPr lang="en-US" sz="1600" i="1" dirty="0">
-                  <a:latin typeface="Cambria Math" charset="0"/>
-                  <a:ea typeface="Cambria Math" charset="0"/>
-                  <a:cs typeface="Cambria Math" charset="0"/>
-                </a:endParaRPr>
-              </a:p>
-            </p:txBody>
-          </p:sp>
-        </mc:Choice>
-        <mc:Fallback>
-          <p:sp>
-            <p:nvSpPr>
               <p:cNvPr id="259" name="TextBox 258"/>
               <p:cNvSpPr txBox="1">
                 <a:spLocks noRot="1" noChangeAspect="1" noMove="1" noResize="1" noEditPoints="1" noAdjustHandles="1" noChangeArrowheads="1" noChangeShapeType="1" noTextEdit="1"/>
@@ -10500,7 +10500,7 @@
             <p:spPr>
               <a:xfrm>
                 <a:off x="6688001" y="2268390"/>
-                <a:ext cx="351763" cy="338554"/>
+                <a:ext cx="387862" cy="338554"/>
               </a:xfrm>
               <a:prstGeom prst="rect">
                 <a:avLst/>
@@ -38804,8 +38804,8 @@
           </a:p>
         </p:txBody>
       </p:sp>
-      <mc:AlternateContent xmlns:mc="http://schemas.openxmlformats.org/markup-compatibility/2006">
-        <mc:Choice xmlns:a14="http://schemas.microsoft.com/office/drawing/2010/main" Requires="a14">
+      <mc:AlternateContent xmlns:mc="http://schemas.openxmlformats.org/markup-compatibility/2006" xmlns:a14="http://schemas.microsoft.com/office/drawing/2010/main">
+        <mc:Choice Requires="a14">
           <p:sp>
             <p:nvSpPr>
               <p:cNvPr id="44" name="TextBox 43"/>
@@ -38855,7 +38855,7 @@
             </p:txBody>
           </p:sp>
         </mc:Choice>
-        <mc:Fallback>
+        <mc:Fallback xmlns="">
           <p:sp>
             <p:nvSpPr>
               <p:cNvPr id="44" name="TextBox 43"/>
@@ -38894,8 +38894,8 @@
           </p:sp>
         </mc:Fallback>
       </mc:AlternateContent>
-      <mc:AlternateContent xmlns:mc="http://schemas.openxmlformats.org/markup-compatibility/2006">
-        <mc:Choice xmlns:a14="http://schemas.microsoft.com/office/drawing/2010/main" Requires="a14">
+      <mc:AlternateContent xmlns:mc="http://schemas.openxmlformats.org/markup-compatibility/2006" xmlns:a14="http://schemas.microsoft.com/office/drawing/2010/main">
+        <mc:Choice Requires="a14">
           <p:sp>
             <p:nvSpPr>
               <p:cNvPr id="45" name="TextBox 44"/>
@@ -38945,7 +38945,7 @@
             </p:txBody>
           </p:sp>
         </mc:Choice>
-        <mc:Fallback>
+        <mc:Fallback xmlns="">
           <p:sp>
             <p:nvSpPr>
               <p:cNvPr id="45" name="TextBox 44"/>
@@ -42152,8 +42152,8 @@
               </p:sp>
             </mc:Fallback>
           </mc:AlternateContent>
-          <mc:AlternateContent xmlns:mc="http://schemas.openxmlformats.org/markup-compatibility/2006">
-            <mc:Choice xmlns:a14="http://schemas.microsoft.com/office/drawing/2010/main" Requires="a14">
+          <mc:AlternateContent xmlns:mc="http://schemas.openxmlformats.org/markup-compatibility/2006" xmlns:a14="http://schemas.microsoft.com/office/drawing/2010/main">
+            <mc:Choice Requires="a14">
               <p:sp>
                 <p:nvSpPr>
                   <p:cNvPr id="144" name="TextBox 143"/>
@@ -42201,7 +42201,7 @@
                 </p:txBody>
               </p:sp>
             </mc:Choice>
-            <mc:Fallback>
+            <mc:Fallback xmlns="">
               <p:sp>
                 <p:nvSpPr>
                   <p:cNvPr id="144" name="TextBox 143"/>

</xml_diff>

<commit_message>
Re-explain filter_clusters and expand on how wrts work
</commit_message>
<xml_diff>
--- a/final_report/images/graphs.pptx
+++ b/final_report/images/graphs.pptx
@@ -209,7 +209,7 @@
           <a:p>
             <a:fld id="{5ADE0F42-1EB1-C14E-B881-EB65E9D225AC}" type="datetimeFigureOut">
               <a:rPr lang="en-US" smtClean="0"/>
-              <a:t>4/6/19</a:t>
+              <a:t>4/14/19</a:t>
             </a:fld>
             <a:endParaRPr lang="en-US"/>
           </a:p>
@@ -1818,7 +1818,7 @@
           <a:p>
             <a:fld id="{75DCEA96-0148-464D-8045-BBEB0C835C6A}" type="datetimeFigureOut">
               <a:rPr lang="en-US" smtClean="0"/>
-              <a:t>4/6/19</a:t>
+              <a:t>4/14/19</a:t>
             </a:fld>
             <a:endParaRPr lang="en-US"/>
           </a:p>
@@ -1983,7 +1983,7 @@
           <a:p>
             <a:fld id="{75DCEA96-0148-464D-8045-BBEB0C835C6A}" type="datetimeFigureOut">
               <a:rPr lang="en-US" smtClean="0"/>
-              <a:t>4/6/19</a:t>
+              <a:t>4/14/19</a:t>
             </a:fld>
             <a:endParaRPr lang="en-US"/>
           </a:p>
@@ -2158,7 +2158,7 @@
           <a:p>
             <a:fld id="{75DCEA96-0148-464D-8045-BBEB0C835C6A}" type="datetimeFigureOut">
               <a:rPr lang="en-US" smtClean="0"/>
-              <a:t>4/6/19</a:t>
+              <a:t>4/14/19</a:t>
             </a:fld>
             <a:endParaRPr lang="en-US"/>
           </a:p>
@@ -2323,7 +2323,7 @@
           <a:p>
             <a:fld id="{75DCEA96-0148-464D-8045-BBEB0C835C6A}" type="datetimeFigureOut">
               <a:rPr lang="en-US" smtClean="0"/>
-              <a:t>4/6/19</a:t>
+              <a:t>4/14/19</a:t>
             </a:fld>
             <a:endParaRPr lang="en-US"/>
           </a:p>
@@ -2564,7 +2564,7 @@
           <a:p>
             <a:fld id="{75DCEA96-0148-464D-8045-BBEB0C835C6A}" type="datetimeFigureOut">
               <a:rPr lang="en-US" smtClean="0"/>
-              <a:t>4/6/19</a:t>
+              <a:t>4/14/19</a:t>
             </a:fld>
             <a:endParaRPr lang="en-US"/>
           </a:p>
@@ -2791,7 +2791,7 @@
           <a:p>
             <a:fld id="{75DCEA96-0148-464D-8045-BBEB0C835C6A}" type="datetimeFigureOut">
               <a:rPr lang="en-US" smtClean="0"/>
-              <a:t>4/6/19</a:t>
+              <a:t>4/14/19</a:t>
             </a:fld>
             <a:endParaRPr lang="en-US"/>
           </a:p>
@@ -3153,7 +3153,7 @@
           <a:p>
             <a:fld id="{75DCEA96-0148-464D-8045-BBEB0C835C6A}" type="datetimeFigureOut">
               <a:rPr lang="en-US" smtClean="0"/>
-              <a:t>4/6/19</a:t>
+              <a:t>4/14/19</a:t>
             </a:fld>
             <a:endParaRPr lang="en-US"/>
           </a:p>
@@ -3266,7 +3266,7 @@
           <a:p>
             <a:fld id="{75DCEA96-0148-464D-8045-BBEB0C835C6A}" type="datetimeFigureOut">
               <a:rPr lang="en-US" smtClean="0"/>
-              <a:t>4/6/19</a:t>
+              <a:t>4/14/19</a:t>
             </a:fld>
             <a:endParaRPr lang="en-US"/>
           </a:p>
@@ -3356,7 +3356,7 @@
           <a:p>
             <a:fld id="{75DCEA96-0148-464D-8045-BBEB0C835C6A}" type="datetimeFigureOut">
               <a:rPr lang="en-US" smtClean="0"/>
-              <a:t>4/6/19</a:t>
+              <a:t>4/14/19</a:t>
             </a:fld>
             <a:endParaRPr lang="en-US"/>
           </a:p>
@@ -3628,7 +3628,7 @@
           <a:p>
             <a:fld id="{75DCEA96-0148-464D-8045-BBEB0C835C6A}" type="datetimeFigureOut">
               <a:rPr lang="en-US" smtClean="0"/>
-              <a:t>4/6/19</a:t>
+              <a:t>4/14/19</a:t>
             </a:fld>
             <a:endParaRPr lang="en-US"/>
           </a:p>
@@ -3880,7 +3880,7 @@
           <a:p>
             <a:fld id="{75DCEA96-0148-464D-8045-BBEB0C835C6A}" type="datetimeFigureOut">
               <a:rPr lang="en-US" smtClean="0"/>
-              <a:t>4/6/19</a:t>
+              <a:t>4/14/19</a:t>
             </a:fld>
             <a:endParaRPr lang="en-US"/>
           </a:p>
@@ -4088,7 +4088,7 @@
           <a:p>
             <a:fld id="{75DCEA96-0148-464D-8045-BBEB0C835C6A}" type="datetimeFigureOut">
               <a:rPr lang="en-US" smtClean="0"/>
-              <a:t>4/6/19</a:t>
+              <a:t>4/14/19</a:t>
             </a:fld>
             <a:endParaRPr lang="en-US"/>
           </a:p>
@@ -7386,7 +7386,7 @@
         </p:nvGrpSpPr>
         <p:grpSpPr>
           <a:xfrm>
-            <a:off x="499580" y="1099619"/>
+            <a:off x="4931880" y="1188519"/>
             <a:ext cx="4002406" cy="3717748"/>
             <a:chOff x="4467540" y="885213"/>
             <a:chExt cx="4002406" cy="3717748"/>
@@ -8797,7 +8797,7 @@
         </p:nvSpPr>
         <p:spPr>
           <a:xfrm>
-            <a:off x="1589823" y="3676476"/>
+            <a:off x="6022123" y="3765376"/>
             <a:ext cx="145774" cy="145774"/>
           </a:xfrm>
           <a:prstGeom prst="rect">
@@ -8843,7 +8843,7 @@
         </p:nvGrpSpPr>
         <p:grpSpPr>
           <a:xfrm>
-            <a:off x="4842600" y="1099619"/>
+            <a:off x="9274900" y="1188519"/>
             <a:ext cx="4002406" cy="3717748"/>
             <a:chOff x="4467540" y="885213"/>
             <a:chExt cx="4002406" cy="3717748"/>
@@ -10160,36 +10160,7 @@
         </p:nvSpPr>
         <p:spPr>
           <a:xfrm>
-            <a:off x="520305" y="991941"/>
-            <a:ext cx="436338" cy="369332"/>
-          </a:xfrm>
-          <a:prstGeom prst="rect">
-            <a:avLst/>
-          </a:prstGeom>
-          <a:noFill/>
-        </p:spPr>
-        <p:txBody>
-          <a:bodyPr wrap="none" rtlCol="0">
-            <a:spAutoFit/>
-          </a:bodyPr>
-          <a:lstStyle/>
-          <a:p>
-            <a:r>
-              <a:rPr lang="en-US" dirty="0"/>
-              <a:t>(a)</a:t>
-            </a:r>
-          </a:p>
-        </p:txBody>
-      </p:sp>
-      <p:sp>
-        <p:nvSpPr>
-          <p:cNvPr id="255" name="TextBox 254"/>
-          <p:cNvSpPr txBox="1"/>
-          <p:nvPr/>
-        </p:nvSpPr>
-        <p:spPr>
-          <a:xfrm>
-            <a:off x="4875116" y="991941"/>
+            <a:off x="4952605" y="1080841"/>
             <a:ext cx="447558" cy="369332"/>
           </a:xfrm>
           <a:prstGeom prst="rect">
@@ -10206,6 +10177,36 @@
             <a:r>
               <a:rPr lang="en-US" dirty="0" smtClean="0"/>
               <a:t>(b)</a:t>
+            </a:r>
+            <a:endParaRPr lang="en-US" dirty="0"/>
+          </a:p>
+        </p:txBody>
+      </p:sp>
+      <p:sp>
+        <p:nvSpPr>
+          <p:cNvPr id="255" name="TextBox 254"/>
+          <p:cNvSpPr txBox="1"/>
+          <p:nvPr/>
+        </p:nvSpPr>
+        <p:spPr>
+          <a:xfrm>
+            <a:off x="9307416" y="1080841"/>
+            <a:ext cx="423514" cy="369332"/>
+          </a:xfrm>
+          <a:prstGeom prst="rect">
+            <a:avLst/>
+          </a:prstGeom>
+          <a:noFill/>
+        </p:spPr>
+        <p:txBody>
+          <a:bodyPr wrap="none" rtlCol="0">
+            <a:spAutoFit/>
+          </a:bodyPr>
+          <a:lstStyle/>
+          <a:p>
+            <a:r>
+              <a:rPr lang="en-US" dirty="0" smtClean="0"/>
+              <a:t>(c)</a:t>
             </a:r>
             <a:endParaRPr lang="en-US" dirty="0"/>
           </a:p>
@@ -10221,7 +10222,7 @@
             </p:nvSpPr>
             <p:spPr>
               <a:xfrm>
-                <a:off x="519937" y="3547076"/>
+                <a:off x="4952237" y="3635976"/>
                 <a:ext cx="351763" cy="338554"/>
               </a:xfrm>
               <a:prstGeom prst="rect">
@@ -10273,7 +10274,7 @@
             </p:nvSpPr>
             <p:spPr>
               <a:xfrm>
-                <a:off x="519937" y="3547076"/>
+                <a:off x="4952237" y="3635976"/>
                 <a:ext cx="351763" cy="338554"/>
               </a:xfrm>
               <a:prstGeom prst="rect">
@@ -10311,7 +10312,7 @@
             </p:nvSpPr>
             <p:spPr>
               <a:xfrm>
-                <a:off x="697737" y="2899376"/>
+                <a:off x="5130037" y="2988276"/>
                 <a:ext cx="347788" cy="338554"/>
               </a:xfrm>
               <a:prstGeom prst="rect">
@@ -10363,7 +10364,7 @@
             </p:nvSpPr>
             <p:spPr>
               <a:xfrm>
-                <a:off x="697737" y="2899376"/>
+                <a:off x="5130037" y="2988276"/>
                 <a:ext cx="347788" cy="338554"/>
               </a:xfrm>
               <a:prstGeom prst="rect">
@@ -10399,7 +10400,7 @@
         </p:nvSpPr>
         <p:spPr>
           <a:xfrm>
-            <a:off x="6542227" y="2379886"/>
+            <a:off x="10974527" y="2468786"/>
             <a:ext cx="145774" cy="145774"/>
           </a:xfrm>
           <a:prstGeom prst="rect">
@@ -10447,7 +10448,7 @@
             </p:nvSpPr>
             <p:spPr>
               <a:xfrm>
-                <a:off x="6688001" y="2268390"/>
+                <a:off x="11120301" y="2357290"/>
                 <a:ext cx="387862" cy="338554"/>
               </a:xfrm>
               <a:prstGeom prst="rect">
@@ -10499,7 +10500,7 @@
             </p:nvSpPr>
             <p:spPr>
               <a:xfrm>
-                <a:off x="6688001" y="2268390"/>
+                <a:off x="11120301" y="2357290"/>
                 <a:ext cx="387862" cy="338554"/>
               </a:xfrm>
               <a:prstGeom prst="rect">
@@ -10527,6 +10528,1728 @@
           </p:sp>
         </mc:Fallback>
       </mc:AlternateContent>
+      <p:grpSp>
+        <p:nvGrpSpPr>
+          <p:cNvPr id="89" name="Group 88"/>
+          <p:cNvGrpSpPr/>
+          <p:nvPr/>
+        </p:nvGrpSpPr>
+        <p:grpSpPr>
+          <a:xfrm>
+            <a:off x="550405" y="1188519"/>
+            <a:ext cx="4002406" cy="3717748"/>
+            <a:chOff x="4467540" y="885213"/>
+            <a:chExt cx="4002406" cy="3717748"/>
+          </a:xfrm>
+        </p:grpSpPr>
+        <p:grpSp>
+          <p:nvGrpSpPr>
+            <p:cNvPr id="90" name="Group 89"/>
+            <p:cNvGrpSpPr/>
+            <p:nvPr/>
+          </p:nvGrpSpPr>
+          <p:grpSpPr>
+            <a:xfrm>
+              <a:off x="4467540" y="885213"/>
+              <a:ext cx="4002406" cy="3717748"/>
+              <a:chOff x="5819262" y="3005561"/>
+              <a:chExt cx="4002406" cy="3717748"/>
+            </a:xfrm>
+          </p:grpSpPr>
+          <p:grpSp>
+            <p:nvGrpSpPr>
+              <p:cNvPr id="94" name="Group 93"/>
+              <p:cNvGrpSpPr/>
+              <p:nvPr/>
+            </p:nvGrpSpPr>
+            <p:grpSpPr>
+              <a:xfrm>
+                <a:off x="5980512" y="3005561"/>
+                <a:ext cx="3724778" cy="3293155"/>
+                <a:chOff x="5980512" y="3005561"/>
+                <a:chExt cx="3724778" cy="3293155"/>
+              </a:xfrm>
+            </p:grpSpPr>
+            <p:cxnSp>
+              <p:nvCxnSpPr>
+                <p:cNvPr id="107" name="Straight Connector 106"/>
+                <p:cNvCxnSpPr/>
+                <p:nvPr/>
+              </p:nvCxnSpPr>
+              <p:spPr>
+                <a:xfrm flipV="1">
+                  <a:off x="6978348" y="5015320"/>
+                  <a:ext cx="215346" cy="629476"/>
+                </a:xfrm>
+                <a:prstGeom prst="line">
+                  <a:avLst/>
+                </a:prstGeom>
+                <a:ln>
+                  <a:solidFill>
+                    <a:schemeClr val="tx1"/>
+                  </a:solidFill>
+                  <a:headEnd type="oval"/>
+                  <a:tailEnd type="none"/>
+                </a:ln>
+              </p:spPr>
+              <p:style>
+                <a:lnRef idx="1">
+                  <a:schemeClr val="accent1"/>
+                </a:lnRef>
+                <a:fillRef idx="0">
+                  <a:schemeClr val="accent1"/>
+                </a:fillRef>
+                <a:effectRef idx="0">
+                  <a:schemeClr val="accent1"/>
+                </a:effectRef>
+                <a:fontRef idx="minor">
+                  <a:schemeClr val="tx1"/>
+                </a:fontRef>
+              </p:style>
+            </p:cxnSp>
+            <p:cxnSp>
+              <p:nvCxnSpPr>
+                <p:cNvPr id="108" name="Straight Connector 107"/>
+                <p:cNvCxnSpPr/>
+                <p:nvPr/>
+              </p:nvCxnSpPr>
+              <p:spPr>
+                <a:xfrm>
+                  <a:off x="7193694" y="5015319"/>
+                  <a:ext cx="192157" cy="629477"/>
+                </a:xfrm>
+                <a:prstGeom prst="line">
+                  <a:avLst/>
+                </a:prstGeom>
+                <a:ln>
+                  <a:solidFill>
+                    <a:schemeClr val="tx1"/>
+                  </a:solidFill>
+                  <a:headEnd type="none"/>
+                  <a:tailEnd type="oval"/>
+                </a:ln>
+              </p:spPr>
+              <p:style>
+                <a:lnRef idx="1">
+                  <a:schemeClr val="accent1"/>
+                </a:lnRef>
+                <a:fillRef idx="0">
+                  <a:schemeClr val="accent1"/>
+                </a:fillRef>
+                <a:effectRef idx="0">
+                  <a:schemeClr val="accent1"/>
+                </a:effectRef>
+                <a:fontRef idx="minor">
+                  <a:schemeClr val="tx1"/>
+                </a:fontRef>
+              </p:style>
+            </p:cxnSp>
+            <p:cxnSp>
+              <p:nvCxnSpPr>
+                <p:cNvPr id="109" name="Straight Connector 108"/>
+                <p:cNvCxnSpPr/>
+                <p:nvPr/>
+              </p:nvCxnSpPr>
+              <p:spPr>
+                <a:xfrm flipV="1">
+                  <a:off x="7199578" y="4377141"/>
+                  <a:ext cx="384313" cy="629477"/>
+                </a:xfrm>
+                <a:prstGeom prst="line">
+                  <a:avLst/>
+                </a:prstGeom>
+                <a:ln>
+                  <a:solidFill>
+                    <a:schemeClr val="tx1"/>
+                  </a:solidFill>
+                  <a:headEnd type="oval"/>
+                  <a:tailEnd type="none"/>
+                </a:ln>
+              </p:spPr>
+              <p:style>
+                <a:lnRef idx="1">
+                  <a:schemeClr val="accent1"/>
+                </a:lnRef>
+                <a:fillRef idx="0">
+                  <a:schemeClr val="accent1"/>
+                </a:fillRef>
+                <a:effectRef idx="0">
+                  <a:schemeClr val="accent1"/>
+                </a:effectRef>
+                <a:fontRef idx="minor">
+                  <a:schemeClr val="tx1"/>
+                </a:fontRef>
+              </p:style>
+            </p:cxnSp>
+            <p:cxnSp>
+              <p:nvCxnSpPr>
+                <p:cNvPr id="110" name="Straight Connector 109"/>
+                <p:cNvCxnSpPr/>
+                <p:nvPr/>
+              </p:nvCxnSpPr>
+              <p:spPr>
+                <a:xfrm>
+                  <a:off x="7583890" y="4377141"/>
+                  <a:ext cx="384313" cy="629477"/>
+                </a:xfrm>
+                <a:prstGeom prst="line">
+                  <a:avLst/>
+                </a:prstGeom>
+                <a:ln>
+                  <a:solidFill>
+                    <a:schemeClr val="tx1"/>
+                  </a:solidFill>
+                  <a:headEnd type="none"/>
+                  <a:tailEnd type="oval"/>
+                </a:ln>
+              </p:spPr>
+              <p:style>
+                <a:lnRef idx="1">
+                  <a:schemeClr val="accent1"/>
+                </a:lnRef>
+                <a:fillRef idx="0">
+                  <a:schemeClr val="accent1"/>
+                </a:fillRef>
+                <a:effectRef idx="0">
+                  <a:schemeClr val="accent1"/>
+                </a:effectRef>
+                <a:fontRef idx="minor">
+                  <a:schemeClr val="tx1"/>
+                </a:fontRef>
+              </p:style>
+            </p:cxnSp>
+            <p:cxnSp>
+              <p:nvCxnSpPr>
+                <p:cNvPr id="111" name="Straight Connector 110"/>
+                <p:cNvCxnSpPr/>
+                <p:nvPr/>
+              </p:nvCxnSpPr>
+              <p:spPr>
+                <a:xfrm flipV="1">
+                  <a:off x="7749543" y="5015320"/>
+                  <a:ext cx="215346" cy="629476"/>
+                </a:xfrm>
+                <a:prstGeom prst="line">
+                  <a:avLst/>
+                </a:prstGeom>
+                <a:ln>
+                  <a:solidFill>
+                    <a:schemeClr val="tx1"/>
+                  </a:solidFill>
+                  <a:headEnd type="oval"/>
+                  <a:tailEnd type="none"/>
+                </a:ln>
+              </p:spPr>
+              <p:style>
+                <a:lnRef idx="1">
+                  <a:schemeClr val="accent1"/>
+                </a:lnRef>
+                <a:fillRef idx="0">
+                  <a:schemeClr val="accent1"/>
+                </a:fillRef>
+                <a:effectRef idx="0">
+                  <a:schemeClr val="accent1"/>
+                </a:effectRef>
+                <a:fontRef idx="minor">
+                  <a:schemeClr val="tx1"/>
+                </a:fontRef>
+              </p:style>
+            </p:cxnSp>
+            <p:cxnSp>
+              <p:nvCxnSpPr>
+                <p:cNvPr id="112" name="Straight Connector 111"/>
+                <p:cNvCxnSpPr/>
+                <p:nvPr/>
+              </p:nvCxnSpPr>
+              <p:spPr>
+                <a:xfrm>
+                  <a:off x="7964889" y="5015319"/>
+                  <a:ext cx="192157" cy="629477"/>
+                </a:xfrm>
+                <a:prstGeom prst="line">
+                  <a:avLst/>
+                </a:prstGeom>
+                <a:ln>
+                  <a:solidFill>
+                    <a:schemeClr val="tx1"/>
+                  </a:solidFill>
+                  <a:headEnd type="none"/>
+                  <a:tailEnd type="oval"/>
+                </a:ln>
+              </p:spPr>
+              <p:style>
+                <a:lnRef idx="1">
+                  <a:schemeClr val="accent1"/>
+                </a:lnRef>
+                <a:fillRef idx="0">
+                  <a:schemeClr val="accent1"/>
+                </a:fillRef>
+                <a:effectRef idx="0">
+                  <a:schemeClr val="accent1"/>
+                </a:effectRef>
+                <a:fontRef idx="minor">
+                  <a:schemeClr val="tx1"/>
+                </a:fontRef>
+              </p:style>
+            </p:cxnSp>
+            <p:cxnSp>
+              <p:nvCxnSpPr>
+                <p:cNvPr id="113" name="Straight Connector 112"/>
+                <p:cNvCxnSpPr/>
+                <p:nvPr/>
+              </p:nvCxnSpPr>
+              <p:spPr>
+                <a:xfrm flipV="1">
+                  <a:off x="6195858" y="5025045"/>
+                  <a:ext cx="215346" cy="629476"/>
+                </a:xfrm>
+                <a:prstGeom prst="line">
+                  <a:avLst/>
+                </a:prstGeom>
+                <a:ln>
+                  <a:solidFill>
+                    <a:schemeClr val="tx1"/>
+                  </a:solidFill>
+                  <a:headEnd type="oval"/>
+                  <a:tailEnd type="none"/>
+                </a:ln>
+              </p:spPr>
+              <p:style>
+                <a:lnRef idx="1">
+                  <a:schemeClr val="accent1"/>
+                </a:lnRef>
+                <a:fillRef idx="0">
+                  <a:schemeClr val="accent1"/>
+                </a:fillRef>
+                <a:effectRef idx="0">
+                  <a:schemeClr val="accent1"/>
+                </a:effectRef>
+                <a:fontRef idx="minor">
+                  <a:schemeClr val="tx1"/>
+                </a:fontRef>
+              </p:style>
+            </p:cxnSp>
+            <p:cxnSp>
+              <p:nvCxnSpPr>
+                <p:cNvPr id="114" name="Straight Connector 113"/>
+                <p:cNvCxnSpPr/>
+                <p:nvPr/>
+              </p:nvCxnSpPr>
+              <p:spPr>
+                <a:xfrm>
+                  <a:off x="6411204" y="5025044"/>
+                  <a:ext cx="192157" cy="629477"/>
+                </a:xfrm>
+                <a:prstGeom prst="line">
+                  <a:avLst/>
+                </a:prstGeom>
+                <a:ln>
+                  <a:solidFill>
+                    <a:schemeClr val="tx1"/>
+                  </a:solidFill>
+                  <a:headEnd type="none"/>
+                  <a:tailEnd type="oval"/>
+                </a:ln>
+              </p:spPr>
+              <p:style>
+                <a:lnRef idx="1">
+                  <a:schemeClr val="accent1"/>
+                </a:lnRef>
+                <a:fillRef idx="0">
+                  <a:schemeClr val="accent1"/>
+                </a:fillRef>
+                <a:effectRef idx="0">
+                  <a:schemeClr val="accent1"/>
+                </a:effectRef>
+                <a:fontRef idx="minor">
+                  <a:schemeClr val="tx1"/>
+                </a:fontRef>
+              </p:style>
+            </p:cxnSp>
+            <p:cxnSp>
+              <p:nvCxnSpPr>
+                <p:cNvPr id="115" name="Straight Connector 114"/>
+                <p:cNvCxnSpPr/>
+                <p:nvPr/>
+              </p:nvCxnSpPr>
+              <p:spPr>
+                <a:xfrm flipV="1">
+                  <a:off x="6412348" y="4377142"/>
+                  <a:ext cx="215346" cy="629476"/>
+                </a:xfrm>
+                <a:prstGeom prst="line">
+                  <a:avLst/>
+                </a:prstGeom>
+                <a:ln>
+                  <a:solidFill>
+                    <a:schemeClr val="tx1"/>
+                  </a:solidFill>
+                  <a:headEnd type="oval"/>
+                  <a:tailEnd type="none"/>
+                </a:ln>
+              </p:spPr>
+              <p:style>
+                <a:lnRef idx="1">
+                  <a:schemeClr val="accent1"/>
+                </a:lnRef>
+                <a:fillRef idx="0">
+                  <a:schemeClr val="accent1"/>
+                </a:fillRef>
+                <a:effectRef idx="0">
+                  <a:schemeClr val="accent1"/>
+                </a:effectRef>
+                <a:fontRef idx="minor">
+                  <a:schemeClr val="tx1"/>
+                </a:fontRef>
+              </p:style>
+            </p:cxnSp>
+            <p:cxnSp>
+              <p:nvCxnSpPr>
+                <p:cNvPr id="116" name="Straight Connector 115"/>
+                <p:cNvCxnSpPr/>
+                <p:nvPr/>
+              </p:nvCxnSpPr>
+              <p:spPr>
+                <a:xfrm>
+                  <a:off x="6627694" y="4377141"/>
+                  <a:ext cx="192157" cy="629477"/>
+                </a:xfrm>
+                <a:prstGeom prst="line">
+                  <a:avLst/>
+                </a:prstGeom>
+                <a:ln>
+                  <a:solidFill>
+                    <a:schemeClr val="tx1"/>
+                  </a:solidFill>
+                  <a:headEnd type="none"/>
+                  <a:tailEnd type="oval"/>
+                </a:ln>
+              </p:spPr>
+              <p:style>
+                <a:lnRef idx="1">
+                  <a:schemeClr val="accent1"/>
+                </a:lnRef>
+                <a:fillRef idx="0">
+                  <a:schemeClr val="accent1"/>
+                </a:fillRef>
+                <a:effectRef idx="0">
+                  <a:schemeClr val="accent1"/>
+                </a:effectRef>
+                <a:fontRef idx="minor">
+                  <a:schemeClr val="tx1"/>
+                </a:fontRef>
+              </p:style>
+            </p:cxnSp>
+            <p:cxnSp>
+              <p:nvCxnSpPr>
+                <p:cNvPr id="117" name="Straight Connector 116"/>
+                <p:cNvCxnSpPr/>
+                <p:nvPr/>
+              </p:nvCxnSpPr>
+              <p:spPr>
+                <a:xfrm flipV="1">
+                  <a:off x="5980512" y="5669240"/>
+                  <a:ext cx="215346" cy="629476"/>
+                </a:xfrm>
+                <a:prstGeom prst="line">
+                  <a:avLst/>
+                </a:prstGeom>
+                <a:ln>
+                  <a:solidFill>
+                    <a:schemeClr val="tx1"/>
+                  </a:solidFill>
+                  <a:headEnd type="oval"/>
+                  <a:tailEnd type="none"/>
+                </a:ln>
+              </p:spPr>
+              <p:style>
+                <a:lnRef idx="1">
+                  <a:schemeClr val="accent1"/>
+                </a:lnRef>
+                <a:fillRef idx="0">
+                  <a:schemeClr val="accent1"/>
+                </a:fillRef>
+                <a:effectRef idx="0">
+                  <a:schemeClr val="accent1"/>
+                </a:effectRef>
+                <a:fontRef idx="minor">
+                  <a:schemeClr val="tx1"/>
+                </a:fontRef>
+              </p:style>
+            </p:cxnSp>
+            <p:cxnSp>
+              <p:nvCxnSpPr>
+                <p:cNvPr id="118" name="Straight Connector 117"/>
+                <p:cNvCxnSpPr/>
+                <p:nvPr/>
+              </p:nvCxnSpPr>
+              <p:spPr>
+                <a:xfrm>
+                  <a:off x="6195858" y="5669239"/>
+                  <a:ext cx="192157" cy="629477"/>
+                </a:xfrm>
+                <a:prstGeom prst="line">
+                  <a:avLst/>
+                </a:prstGeom>
+                <a:ln>
+                  <a:solidFill>
+                    <a:schemeClr val="tx1"/>
+                  </a:solidFill>
+                  <a:headEnd type="none"/>
+                  <a:tailEnd type="oval"/>
+                </a:ln>
+              </p:spPr>
+              <p:style>
+                <a:lnRef idx="1">
+                  <a:schemeClr val="accent1"/>
+                </a:lnRef>
+                <a:fillRef idx="0">
+                  <a:schemeClr val="accent1"/>
+                </a:fillRef>
+                <a:effectRef idx="0">
+                  <a:schemeClr val="accent1"/>
+                </a:effectRef>
+                <a:fontRef idx="minor">
+                  <a:schemeClr val="tx1"/>
+                </a:fontRef>
+              </p:style>
+            </p:cxnSp>
+            <p:grpSp>
+              <p:nvGrpSpPr>
+                <p:cNvPr id="119" name="Group 118"/>
+                <p:cNvGrpSpPr/>
+                <p:nvPr/>
+              </p:nvGrpSpPr>
+              <p:grpSpPr>
+                <a:xfrm>
+                  <a:off x="6625399" y="3005561"/>
+                  <a:ext cx="2695578" cy="1353154"/>
+                  <a:chOff x="6625402" y="3005561"/>
+                  <a:chExt cx="2161623" cy="1353154"/>
+                </a:xfrm>
+              </p:grpSpPr>
+              <p:cxnSp>
+                <p:nvCxnSpPr>
+                  <p:cNvPr id="124" name="Straight Connector 123"/>
+                  <p:cNvCxnSpPr/>
+                  <p:nvPr/>
+                </p:nvCxnSpPr>
+                <p:spPr>
+                  <a:xfrm flipV="1">
+                    <a:off x="6625402" y="3729238"/>
+                    <a:ext cx="384313" cy="629477"/>
+                  </a:xfrm>
+                  <a:prstGeom prst="line">
+                    <a:avLst/>
+                  </a:prstGeom>
+                  <a:ln>
+                    <a:solidFill>
+                      <a:schemeClr val="tx1"/>
+                    </a:solidFill>
+                    <a:headEnd type="oval"/>
+                    <a:tailEnd type="none"/>
+                  </a:ln>
+                </p:spPr>
+                <p:style>
+                  <a:lnRef idx="1">
+                    <a:schemeClr val="accent1"/>
+                  </a:lnRef>
+                  <a:fillRef idx="0">
+                    <a:schemeClr val="accent1"/>
+                  </a:fillRef>
+                  <a:effectRef idx="0">
+                    <a:schemeClr val="accent1"/>
+                  </a:effectRef>
+                  <a:fontRef idx="minor">
+                    <a:schemeClr val="tx1"/>
+                  </a:fontRef>
+                </p:style>
+              </p:cxnSp>
+              <p:cxnSp>
+                <p:nvCxnSpPr>
+                  <p:cNvPr id="125" name="Straight Connector 124"/>
+                  <p:cNvCxnSpPr/>
+                  <p:nvPr/>
+                </p:nvCxnSpPr>
+                <p:spPr>
+                  <a:xfrm>
+                    <a:off x="7009714" y="3729238"/>
+                    <a:ext cx="384313" cy="629477"/>
+                  </a:xfrm>
+                  <a:prstGeom prst="line">
+                    <a:avLst/>
+                  </a:prstGeom>
+                  <a:ln>
+                    <a:solidFill>
+                      <a:schemeClr val="tx1"/>
+                    </a:solidFill>
+                    <a:headEnd type="none"/>
+                    <a:tailEnd type="oval"/>
+                  </a:ln>
+                </p:spPr>
+                <p:style>
+                  <a:lnRef idx="1">
+                    <a:schemeClr val="accent1"/>
+                  </a:lnRef>
+                  <a:fillRef idx="0">
+                    <a:schemeClr val="accent1"/>
+                  </a:fillRef>
+                  <a:effectRef idx="0">
+                    <a:schemeClr val="accent1"/>
+                  </a:effectRef>
+                  <a:fontRef idx="minor">
+                    <a:schemeClr val="tx1"/>
+                  </a:fontRef>
+                </p:style>
+              </p:cxnSp>
+              <p:cxnSp>
+                <p:nvCxnSpPr>
+                  <p:cNvPr id="126" name="Straight Connector 125"/>
+                  <p:cNvCxnSpPr/>
+                  <p:nvPr/>
+                </p:nvCxnSpPr>
+                <p:spPr>
+                  <a:xfrm flipV="1">
+                    <a:off x="7012731" y="3005561"/>
+                    <a:ext cx="683902" cy="723364"/>
+                  </a:xfrm>
+                  <a:prstGeom prst="line">
+                    <a:avLst/>
+                  </a:prstGeom>
+                  <a:ln>
+                    <a:solidFill>
+                      <a:schemeClr val="tx1"/>
+                    </a:solidFill>
+                    <a:headEnd type="oval"/>
+                    <a:tailEnd type="oval"/>
+                  </a:ln>
+                </p:spPr>
+                <p:style>
+                  <a:lnRef idx="1">
+                    <a:schemeClr val="accent1"/>
+                  </a:lnRef>
+                  <a:fillRef idx="0">
+                    <a:schemeClr val="accent1"/>
+                  </a:fillRef>
+                  <a:effectRef idx="0">
+                    <a:schemeClr val="accent1"/>
+                  </a:effectRef>
+                  <a:fontRef idx="minor">
+                    <a:schemeClr val="tx1"/>
+                  </a:fontRef>
+                </p:style>
+              </p:cxnSp>
+              <p:cxnSp>
+                <p:nvCxnSpPr>
+                  <p:cNvPr id="127" name="Straight Connector 126"/>
+                  <p:cNvCxnSpPr/>
+                  <p:nvPr/>
+                </p:nvCxnSpPr>
+                <p:spPr>
+                  <a:xfrm flipH="1" flipV="1">
+                    <a:off x="7702217" y="3005562"/>
+                    <a:ext cx="700496" cy="714975"/>
+                  </a:xfrm>
+                  <a:prstGeom prst="line">
+                    <a:avLst/>
+                  </a:prstGeom>
+                  <a:ln>
+                    <a:solidFill>
+                      <a:schemeClr val="tx1"/>
+                    </a:solidFill>
+                    <a:headEnd type="oval"/>
+                    <a:tailEnd type="none"/>
+                  </a:ln>
+                </p:spPr>
+                <p:style>
+                  <a:lnRef idx="1">
+                    <a:schemeClr val="accent1"/>
+                  </a:lnRef>
+                  <a:fillRef idx="0">
+                    <a:schemeClr val="accent1"/>
+                  </a:fillRef>
+                  <a:effectRef idx="0">
+                    <a:schemeClr val="accent1"/>
+                  </a:effectRef>
+                  <a:fontRef idx="minor">
+                    <a:schemeClr val="tx1"/>
+                  </a:fontRef>
+                </p:style>
+              </p:cxnSp>
+              <p:cxnSp>
+                <p:nvCxnSpPr>
+                  <p:cNvPr id="170" name="Straight Connector 169"/>
+                  <p:cNvCxnSpPr/>
+                  <p:nvPr/>
+                </p:nvCxnSpPr>
+                <p:spPr>
+                  <a:xfrm flipV="1">
+                    <a:off x="8018400" y="3716872"/>
+                    <a:ext cx="384313" cy="629477"/>
+                  </a:xfrm>
+                  <a:prstGeom prst="line">
+                    <a:avLst/>
+                  </a:prstGeom>
+                  <a:ln>
+                    <a:solidFill>
+                      <a:schemeClr val="tx1"/>
+                    </a:solidFill>
+                    <a:headEnd type="oval"/>
+                    <a:tailEnd type="none"/>
+                  </a:ln>
+                </p:spPr>
+                <p:style>
+                  <a:lnRef idx="1">
+                    <a:schemeClr val="accent1"/>
+                  </a:lnRef>
+                  <a:fillRef idx="0">
+                    <a:schemeClr val="accent1"/>
+                  </a:fillRef>
+                  <a:effectRef idx="0">
+                    <a:schemeClr val="accent1"/>
+                  </a:effectRef>
+                  <a:fontRef idx="minor">
+                    <a:schemeClr val="tx1"/>
+                  </a:fontRef>
+                </p:style>
+              </p:cxnSp>
+              <p:cxnSp>
+                <p:nvCxnSpPr>
+                  <p:cNvPr id="171" name="Straight Connector 170"/>
+                  <p:cNvCxnSpPr/>
+                  <p:nvPr/>
+                </p:nvCxnSpPr>
+                <p:spPr>
+                  <a:xfrm>
+                    <a:off x="8402712" y="3716872"/>
+                    <a:ext cx="384313" cy="629477"/>
+                  </a:xfrm>
+                  <a:prstGeom prst="line">
+                    <a:avLst/>
+                  </a:prstGeom>
+                  <a:ln>
+                    <a:solidFill>
+                      <a:schemeClr val="tx1"/>
+                    </a:solidFill>
+                    <a:headEnd type="none"/>
+                    <a:tailEnd type="oval"/>
+                  </a:ln>
+                </p:spPr>
+                <p:style>
+                  <a:lnRef idx="1">
+                    <a:schemeClr val="accent1"/>
+                  </a:lnRef>
+                  <a:fillRef idx="0">
+                    <a:schemeClr val="accent1"/>
+                  </a:fillRef>
+                  <a:effectRef idx="0">
+                    <a:schemeClr val="accent1"/>
+                  </a:effectRef>
+                  <a:fontRef idx="minor">
+                    <a:schemeClr val="tx1"/>
+                  </a:fontRef>
+                </p:style>
+              </p:cxnSp>
+            </p:grpSp>
+            <p:cxnSp>
+              <p:nvCxnSpPr>
+                <p:cNvPr id="120" name="Straight Connector 119"/>
+                <p:cNvCxnSpPr/>
+                <p:nvPr/>
+              </p:nvCxnSpPr>
+              <p:spPr>
+                <a:xfrm flipV="1">
+                  <a:off x="8936665" y="4376041"/>
+                  <a:ext cx="384313" cy="629477"/>
+                </a:xfrm>
+                <a:prstGeom prst="line">
+                  <a:avLst/>
+                </a:prstGeom>
+                <a:ln>
+                  <a:solidFill>
+                    <a:schemeClr val="tx1"/>
+                  </a:solidFill>
+                  <a:headEnd type="oval"/>
+                  <a:tailEnd type="none"/>
+                </a:ln>
+              </p:spPr>
+              <p:style>
+                <a:lnRef idx="1">
+                  <a:schemeClr val="accent1"/>
+                </a:lnRef>
+                <a:fillRef idx="0">
+                  <a:schemeClr val="accent1"/>
+                </a:fillRef>
+                <a:effectRef idx="0">
+                  <a:schemeClr val="accent1"/>
+                </a:effectRef>
+                <a:fontRef idx="minor">
+                  <a:schemeClr val="tx1"/>
+                </a:fontRef>
+              </p:style>
+            </p:cxnSp>
+            <p:cxnSp>
+              <p:nvCxnSpPr>
+                <p:cNvPr id="121" name="Straight Connector 120"/>
+                <p:cNvCxnSpPr/>
+                <p:nvPr/>
+              </p:nvCxnSpPr>
+              <p:spPr>
+                <a:xfrm>
+                  <a:off x="9320977" y="4376041"/>
+                  <a:ext cx="384313" cy="629477"/>
+                </a:xfrm>
+                <a:prstGeom prst="line">
+                  <a:avLst/>
+                </a:prstGeom>
+                <a:ln>
+                  <a:solidFill>
+                    <a:schemeClr val="tx1"/>
+                  </a:solidFill>
+                  <a:headEnd type="none"/>
+                  <a:tailEnd type="oval"/>
+                </a:ln>
+              </p:spPr>
+              <p:style>
+                <a:lnRef idx="1">
+                  <a:schemeClr val="accent1"/>
+                </a:lnRef>
+                <a:fillRef idx="0">
+                  <a:schemeClr val="accent1"/>
+                </a:fillRef>
+                <a:effectRef idx="0">
+                  <a:schemeClr val="accent1"/>
+                </a:effectRef>
+                <a:fontRef idx="minor">
+                  <a:schemeClr val="tx1"/>
+                </a:fontRef>
+              </p:style>
+            </p:cxnSp>
+            <p:cxnSp>
+              <p:nvCxnSpPr>
+                <p:cNvPr id="122" name="Straight Connector 121"/>
+                <p:cNvCxnSpPr/>
+                <p:nvPr/>
+              </p:nvCxnSpPr>
+              <p:spPr>
+                <a:xfrm flipV="1">
+                  <a:off x="8718005" y="5005519"/>
+                  <a:ext cx="215346" cy="629476"/>
+                </a:xfrm>
+                <a:prstGeom prst="line">
+                  <a:avLst/>
+                </a:prstGeom>
+                <a:ln>
+                  <a:solidFill>
+                    <a:schemeClr val="tx1"/>
+                  </a:solidFill>
+                  <a:headEnd type="oval"/>
+                  <a:tailEnd type="none"/>
+                </a:ln>
+              </p:spPr>
+              <p:style>
+                <a:lnRef idx="1">
+                  <a:schemeClr val="accent1"/>
+                </a:lnRef>
+                <a:fillRef idx="0">
+                  <a:schemeClr val="accent1"/>
+                </a:fillRef>
+                <a:effectRef idx="0">
+                  <a:schemeClr val="accent1"/>
+                </a:effectRef>
+                <a:fontRef idx="minor">
+                  <a:schemeClr val="tx1"/>
+                </a:fontRef>
+              </p:style>
+            </p:cxnSp>
+            <p:cxnSp>
+              <p:nvCxnSpPr>
+                <p:cNvPr id="123" name="Straight Connector 122"/>
+                <p:cNvCxnSpPr/>
+                <p:nvPr/>
+              </p:nvCxnSpPr>
+              <p:spPr>
+                <a:xfrm>
+                  <a:off x="8933351" y="5005518"/>
+                  <a:ext cx="192157" cy="629477"/>
+                </a:xfrm>
+                <a:prstGeom prst="line">
+                  <a:avLst/>
+                </a:prstGeom>
+                <a:ln>
+                  <a:solidFill>
+                    <a:schemeClr val="tx1"/>
+                  </a:solidFill>
+                  <a:headEnd type="none"/>
+                  <a:tailEnd type="oval"/>
+                </a:ln>
+              </p:spPr>
+              <p:style>
+                <a:lnRef idx="1">
+                  <a:schemeClr val="accent1"/>
+                </a:lnRef>
+                <a:fillRef idx="0">
+                  <a:schemeClr val="accent1"/>
+                </a:fillRef>
+                <a:effectRef idx="0">
+                  <a:schemeClr val="accent1"/>
+                </a:effectRef>
+                <a:fontRef idx="minor">
+                  <a:schemeClr val="tx1"/>
+                </a:fontRef>
+              </p:style>
+            </p:cxnSp>
+          </p:grpSp>
+          <p:sp>
+            <p:nvSpPr>
+              <p:cNvPr id="95" name="TextBox 94"/>
+              <p:cNvSpPr txBox="1"/>
+              <p:nvPr/>
+            </p:nvSpPr>
+            <p:spPr>
+              <a:xfrm>
+                <a:off x="5819262" y="6313435"/>
+                <a:ext cx="290464" cy="338554"/>
+              </a:xfrm>
+              <a:prstGeom prst="rect">
+                <a:avLst/>
+              </a:prstGeom>
+              <a:noFill/>
+            </p:spPr>
+            <p:txBody>
+              <a:bodyPr wrap="none" rtlCol="0">
+                <a:spAutoFit/>
+              </a:bodyPr>
+              <a:lstStyle/>
+              <a:p>
+                <a:r>
+                  <a:rPr lang="en-US" sz="1600" dirty="0">
+                    <a:latin typeface="Apple Chancery" charset="0"/>
+                    <a:ea typeface="Apple Chancery" charset="0"/>
+                    <a:cs typeface="Apple Chancery" charset="0"/>
+                  </a:rPr>
+                  <a:t>a</a:t>
+                </a:r>
+              </a:p>
+            </p:txBody>
+          </p:sp>
+          <p:sp>
+            <p:nvSpPr>
+              <p:cNvPr id="96" name="TextBox 95"/>
+              <p:cNvSpPr txBox="1"/>
+              <p:nvPr/>
+            </p:nvSpPr>
+            <p:spPr>
+              <a:xfrm>
+                <a:off x="6245989" y="6384755"/>
+                <a:ext cx="284052" cy="338554"/>
+              </a:xfrm>
+              <a:prstGeom prst="rect">
+                <a:avLst/>
+              </a:prstGeom>
+              <a:noFill/>
+            </p:spPr>
+            <p:txBody>
+              <a:bodyPr wrap="none" rtlCol="0">
+                <a:spAutoFit/>
+              </a:bodyPr>
+              <a:lstStyle/>
+              <a:p>
+                <a:r>
+                  <a:rPr lang="en-US" sz="1600" dirty="0">
+                    <a:latin typeface="Apple Chancery" charset="0"/>
+                    <a:ea typeface="Apple Chancery" charset="0"/>
+                    <a:cs typeface="Apple Chancery" charset="0"/>
+                  </a:rPr>
+                  <a:t>b</a:t>
+                </a:r>
+              </a:p>
+            </p:txBody>
+          </p:sp>
+          <p:sp>
+            <p:nvSpPr>
+              <p:cNvPr id="97" name="TextBox 96"/>
+              <p:cNvSpPr txBox="1"/>
+              <p:nvPr/>
+            </p:nvSpPr>
+            <p:spPr>
+              <a:xfrm>
+                <a:off x="6479725" y="5663222"/>
+                <a:ext cx="263214" cy="338554"/>
+              </a:xfrm>
+              <a:prstGeom prst="rect">
+                <a:avLst/>
+              </a:prstGeom>
+              <a:noFill/>
+            </p:spPr>
+            <p:txBody>
+              <a:bodyPr wrap="none" rtlCol="0">
+                <a:spAutoFit/>
+              </a:bodyPr>
+              <a:lstStyle/>
+              <a:p>
+                <a:r>
+                  <a:rPr lang="en-US" sz="1600" dirty="0">
+                    <a:latin typeface="Apple Chancery" charset="0"/>
+                    <a:ea typeface="Apple Chancery" charset="0"/>
+                    <a:cs typeface="Apple Chancery" charset="0"/>
+                  </a:rPr>
+                  <a:t>c</a:t>
+                </a:r>
+              </a:p>
+            </p:txBody>
+          </p:sp>
+          <p:sp>
+            <p:nvSpPr>
+              <p:cNvPr id="98" name="TextBox 97"/>
+              <p:cNvSpPr txBox="1"/>
+              <p:nvPr/>
+            </p:nvSpPr>
+            <p:spPr>
+              <a:xfrm>
+                <a:off x="6625402" y="5046656"/>
+                <a:ext cx="290464" cy="338554"/>
+              </a:xfrm>
+              <a:prstGeom prst="rect">
+                <a:avLst/>
+              </a:prstGeom>
+              <a:noFill/>
+            </p:spPr>
+            <p:txBody>
+              <a:bodyPr wrap="none" rtlCol="0">
+                <a:spAutoFit/>
+              </a:bodyPr>
+              <a:lstStyle/>
+              <a:p>
+                <a:r>
+                  <a:rPr lang="en-US" sz="1600" dirty="0">
+                    <a:latin typeface="Apple Chancery" charset="0"/>
+                    <a:ea typeface="Apple Chancery" charset="0"/>
+                    <a:cs typeface="Apple Chancery" charset="0"/>
+                  </a:rPr>
+                  <a:t>d</a:t>
+                </a:r>
+              </a:p>
+            </p:txBody>
+          </p:sp>
+          <p:sp>
+            <p:nvSpPr>
+              <p:cNvPr id="99" name="TextBox 98"/>
+              <p:cNvSpPr txBox="1"/>
+              <p:nvPr/>
+            </p:nvSpPr>
+            <p:spPr>
+              <a:xfrm>
+                <a:off x="6846796" y="5645423"/>
+                <a:ext cx="261610" cy="338554"/>
+              </a:xfrm>
+              <a:prstGeom prst="rect">
+                <a:avLst/>
+              </a:prstGeom>
+              <a:noFill/>
+            </p:spPr>
+            <p:txBody>
+              <a:bodyPr wrap="none" rtlCol="0">
+                <a:spAutoFit/>
+              </a:bodyPr>
+              <a:lstStyle/>
+              <a:p>
+                <a:r>
+                  <a:rPr lang="en-US" sz="1600" dirty="0">
+                    <a:latin typeface="Apple Chancery" charset="0"/>
+                    <a:ea typeface="Apple Chancery" charset="0"/>
+                    <a:cs typeface="Apple Chancery" charset="0"/>
+                  </a:rPr>
+                  <a:t>e</a:t>
+                </a:r>
+              </a:p>
+            </p:txBody>
+          </p:sp>
+          <p:sp>
+            <p:nvSpPr>
+              <p:cNvPr id="100" name="TextBox 99"/>
+              <p:cNvSpPr txBox="1"/>
+              <p:nvPr/>
+            </p:nvSpPr>
+            <p:spPr>
+              <a:xfrm>
+                <a:off x="7240700" y="5730295"/>
+                <a:ext cx="248786" cy="338554"/>
+              </a:xfrm>
+              <a:prstGeom prst="rect">
+                <a:avLst/>
+              </a:prstGeom>
+              <a:noFill/>
+            </p:spPr>
+            <p:txBody>
+              <a:bodyPr wrap="none" rtlCol="0">
+                <a:spAutoFit/>
+              </a:bodyPr>
+              <a:lstStyle/>
+              <a:p>
+                <a:r>
+                  <a:rPr lang="en-US" sz="1600" dirty="0">
+                    <a:latin typeface="Apple Chancery" charset="0"/>
+                    <a:ea typeface="Apple Chancery" charset="0"/>
+                    <a:cs typeface="Apple Chancery" charset="0"/>
+                  </a:rPr>
+                  <a:t>f</a:t>
+                </a:r>
+              </a:p>
+            </p:txBody>
+          </p:sp>
+          <p:sp>
+            <p:nvSpPr>
+              <p:cNvPr id="101" name="TextBox 100"/>
+              <p:cNvSpPr txBox="1"/>
+              <p:nvPr/>
+            </p:nvSpPr>
+            <p:spPr>
+              <a:xfrm>
+                <a:off x="7606167" y="5663222"/>
+                <a:ext cx="280846" cy="338554"/>
+              </a:xfrm>
+              <a:prstGeom prst="rect">
+                <a:avLst/>
+              </a:prstGeom>
+              <a:noFill/>
+            </p:spPr>
+            <p:txBody>
+              <a:bodyPr wrap="none" rtlCol="0">
+                <a:spAutoFit/>
+              </a:bodyPr>
+              <a:lstStyle/>
+              <a:p>
+                <a:r>
+                  <a:rPr lang="en-US" sz="1600" dirty="0">
+                    <a:latin typeface="Apple Chancery" charset="0"/>
+                    <a:ea typeface="Apple Chancery" charset="0"/>
+                    <a:cs typeface="Apple Chancery" charset="0"/>
+                  </a:rPr>
+                  <a:t>g</a:t>
+                </a:r>
+              </a:p>
+            </p:txBody>
+          </p:sp>
+          <p:sp>
+            <p:nvSpPr>
+              <p:cNvPr id="102" name="TextBox 101"/>
+              <p:cNvSpPr txBox="1"/>
+              <p:nvPr/>
+            </p:nvSpPr>
+            <p:spPr>
+              <a:xfrm>
+                <a:off x="8003694" y="5740014"/>
+                <a:ext cx="293670" cy="338554"/>
+              </a:xfrm>
+              <a:prstGeom prst="rect">
+                <a:avLst/>
+              </a:prstGeom>
+              <a:noFill/>
+            </p:spPr>
+            <p:txBody>
+              <a:bodyPr wrap="none" rtlCol="0">
+                <a:spAutoFit/>
+              </a:bodyPr>
+              <a:lstStyle/>
+              <a:p>
+                <a:r>
+                  <a:rPr lang="en-US" sz="1600" dirty="0">
+                    <a:latin typeface="Apple Chancery" charset="0"/>
+                    <a:ea typeface="Apple Chancery" charset="0"/>
+                    <a:cs typeface="Apple Chancery" charset="0"/>
+                  </a:rPr>
+                  <a:t>h</a:t>
+                </a:r>
+              </a:p>
+            </p:txBody>
+          </p:sp>
+          <p:sp>
+            <p:nvSpPr>
+              <p:cNvPr id="103" name="TextBox 102"/>
+              <p:cNvSpPr txBox="1"/>
+              <p:nvPr/>
+            </p:nvSpPr>
+            <p:spPr>
+              <a:xfrm>
+                <a:off x="8211192" y="4376041"/>
+                <a:ext cx="245580" cy="338554"/>
+              </a:xfrm>
+              <a:prstGeom prst="rect">
+                <a:avLst/>
+              </a:prstGeom>
+              <a:noFill/>
+            </p:spPr>
+            <p:txBody>
+              <a:bodyPr wrap="none" rtlCol="0">
+                <a:spAutoFit/>
+              </a:bodyPr>
+              <a:lstStyle/>
+              <a:p>
+                <a:r>
+                  <a:rPr lang="en-US" sz="1600" dirty="0">
+                    <a:latin typeface="Apple Chancery" charset="0"/>
+                    <a:ea typeface="Apple Chancery" charset="0"/>
+                    <a:cs typeface="Apple Chancery" charset="0"/>
+                  </a:rPr>
+                  <a:t>i</a:t>
+                </a:r>
+              </a:p>
+            </p:txBody>
+          </p:sp>
+          <p:sp>
+            <p:nvSpPr>
+              <p:cNvPr id="104" name="TextBox 103"/>
+              <p:cNvSpPr txBox="1"/>
+              <p:nvPr/>
+            </p:nvSpPr>
+            <p:spPr>
+              <a:xfrm>
+                <a:off x="9582500" y="5082587"/>
+                <a:ext cx="239168" cy="338554"/>
+              </a:xfrm>
+              <a:prstGeom prst="rect">
+                <a:avLst/>
+              </a:prstGeom>
+              <a:noFill/>
+            </p:spPr>
+            <p:txBody>
+              <a:bodyPr wrap="none" rtlCol="0">
+                <a:spAutoFit/>
+              </a:bodyPr>
+              <a:lstStyle/>
+              <a:p>
+                <a:r>
+                  <a:rPr lang="en-US" sz="1600" dirty="0">
+                    <a:latin typeface="Apple Chancery" charset="0"/>
+                    <a:ea typeface="Apple Chancery" charset="0"/>
+                    <a:cs typeface="Apple Chancery" charset="0"/>
+                  </a:rPr>
+                  <a:t>l</a:t>
+                </a:r>
+              </a:p>
+            </p:txBody>
+          </p:sp>
+          <p:sp>
+            <p:nvSpPr>
+              <p:cNvPr id="105" name="TextBox 104"/>
+              <p:cNvSpPr txBox="1"/>
+              <p:nvPr/>
+            </p:nvSpPr>
+            <p:spPr>
+              <a:xfrm>
+                <a:off x="8999510" y="5716993"/>
+                <a:ext cx="279244" cy="338554"/>
+              </a:xfrm>
+              <a:prstGeom prst="rect">
+                <a:avLst/>
+              </a:prstGeom>
+              <a:noFill/>
+            </p:spPr>
+            <p:txBody>
+              <a:bodyPr wrap="none" rtlCol="0">
+                <a:spAutoFit/>
+              </a:bodyPr>
+              <a:lstStyle/>
+              <a:p>
+                <a:r>
+                  <a:rPr lang="en-US" sz="1600" dirty="0">
+                    <a:latin typeface="Apple Chancery" charset="0"/>
+                    <a:ea typeface="Apple Chancery" charset="0"/>
+                    <a:cs typeface="Apple Chancery" charset="0"/>
+                  </a:rPr>
+                  <a:t>k</a:t>
+                </a:r>
+              </a:p>
+            </p:txBody>
+          </p:sp>
+          <p:sp>
+            <p:nvSpPr>
+              <p:cNvPr id="106" name="TextBox 105"/>
+              <p:cNvSpPr txBox="1"/>
+              <p:nvPr/>
+            </p:nvSpPr>
+            <p:spPr>
+              <a:xfrm>
+                <a:off x="8589159" y="5663222"/>
+                <a:ext cx="239168" cy="338554"/>
+              </a:xfrm>
+              <a:prstGeom prst="rect">
+                <a:avLst/>
+              </a:prstGeom>
+              <a:noFill/>
+            </p:spPr>
+            <p:txBody>
+              <a:bodyPr wrap="none" rtlCol="0">
+                <a:spAutoFit/>
+              </a:bodyPr>
+              <a:lstStyle/>
+              <a:p>
+                <a:r>
+                  <a:rPr lang="en-US" sz="1600" dirty="0">
+                    <a:latin typeface="Apple Chancery" charset="0"/>
+                    <a:ea typeface="Apple Chancery" charset="0"/>
+                    <a:cs typeface="Apple Chancery" charset="0"/>
+                  </a:rPr>
+                  <a:t>j</a:t>
+                </a:r>
+              </a:p>
+            </p:txBody>
+          </p:sp>
+        </p:grpSp>
+        <p:sp>
+          <p:nvSpPr>
+            <p:cNvPr id="91" name="Oval 90"/>
+            <p:cNvSpPr/>
+            <p:nvPr/>
+          </p:nvSpPr>
+          <p:spPr>
+            <a:xfrm>
+              <a:off x="4983414" y="2814820"/>
+              <a:ext cx="144394" cy="144394"/>
+            </a:xfrm>
+            <a:prstGeom prst="ellipse">
+              <a:avLst/>
+            </a:prstGeom>
+            <a:noFill/>
+            <a:ln>
+              <a:solidFill>
+                <a:schemeClr val="tx1"/>
+              </a:solidFill>
+            </a:ln>
+            <a:effectLst/>
+          </p:spPr>
+          <p:style>
+            <a:lnRef idx="2">
+              <a:schemeClr val="accent1">
+                <a:shade val="50000"/>
+              </a:schemeClr>
+            </a:lnRef>
+            <a:fillRef idx="1">
+              <a:schemeClr val="accent1"/>
+            </a:fillRef>
+            <a:effectRef idx="0">
+              <a:schemeClr val="accent1"/>
+            </a:effectRef>
+            <a:fontRef idx="minor">
+              <a:schemeClr val="lt1"/>
+            </a:fontRef>
+          </p:style>
+          <p:txBody>
+            <a:bodyPr rtlCol="0" anchor="ctr"/>
+            <a:lstStyle/>
+            <a:p>
+              <a:pPr algn="ctr"/>
+              <a:endParaRPr lang="en-US"/>
+            </a:p>
+          </p:txBody>
+        </p:sp>
+        <p:sp>
+          <p:nvSpPr>
+            <p:cNvPr id="92" name="Oval 91"/>
+            <p:cNvSpPr/>
+            <p:nvPr/>
+          </p:nvSpPr>
+          <p:spPr>
+            <a:xfrm>
+              <a:off x="5961932" y="3452251"/>
+              <a:ext cx="144394" cy="144394"/>
+            </a:xfrm>
+            <a:prstGeom prst="ellipse">
+              <a:avLst/>
+            </a:prstGeom>
+            <a:noFill/>
+            <a:ln>
+              <a:solidFill>
+                <a:schemeClr val="tx1"/>
+              </a:solidFill>
+            </a:ln>
+            <a:effectLst/>
+          </p:spPr>
+          <p:style>
+            <a:lnRef idx="2">
+              <a:schemeClr val="accent1">
+                <a:shade val="50000"/>
+              </a:schemeClr>
+            </a:lnRef>
+            <a:fillRef idx="1">
+              <a:schemeClr val="accent1"/>
+            </a:fillRef>
+            <a:effectRef idx="0">
+              <a:schemeClr val="accent1"/>
+            </a:effectRef>
+            <a:fontRef idx="minor">
+              <a:schemeClr val="lt1"/>
+            </a:fontRef>
+          </p:style>
+          <p:txBody>
+            <a:bodyPr rtlCol="0" anchor="ctr"/>
+            <a:lstStyle/>
+            <a:p>
+              <a:pPr algn="ctr"/>
+              <a:endParaRPr lang="en-US"/>
+            </a:p>
+          </p:txBody>
+        </p:sp>
+        <p:sp>
+          <p:nvSpPr>
+            <p:cNvPr id="93" name="Oval 92"/>
+            <p:cNvSpPr/>
+            <p:nvPr/>
+          </p:nvSpPr>
+          <p:spPr>
+            <a:xfrm>
+              <a:off x="6537324" y="2822221"/>
+              <a:ext cx="144394" cy="144394"/>
+            </a:xfrm>
+            <a:prstGeom prst="ellipse">
+              <a:avLst/>
+            </a:prstGeom>
+            <a:noFill/>
+            <a:ln>
+              <a:solidFill>
+                <a:schemeClr val="tx1"/>
+              </a:solidFill>
+            </a:ln>
+            <a:effectLst/>
+          </p:spPr>
+          <p:style>
+            <a:lnRef idx="2">
+              <a:schemeClr val="accent1">
+                <a:shade val="50000"/>
+              </a:schemeClr>
+            </a:lnRef>
+            <a:fillRef idx="1">
+              <a:schemeClr val="accent1"/>
+            </a:fillRef>
+            <a:effectRef idx="0">
+              <a:schemeClr val="accent1"/>
+            </a:effectRef>
+            <a:fontRef idx="minor">
+              <a:schemeClr val="lt1"/>
+            </a:fontRef>
+          </p:style>
+          <p:txBody>
+            <a:bodyPr rtlCol="0" anchor="ctr"/>
+            <a:lstStyle/>
+            <a:p>
+              <a:pPr algn="ctr"/>
+              <a:endParaRPr lang="en-US"/>
+            </a:p>
+          </p:txBody>
+        </p:sp>
+        <p:sp>
+          <p:nvSpPr>
+            <p:cNvPr id="177" name="Oval 176"/>
+            <p:cNvSpPr/>
+            <p:nvPr/>
+          </p:nvSpPr>
+          <p:spPr>
+            <a:xfrm>
+              <a:off x="5186614" y="3462520"/>
+              <a:ext cx="144394" cy="144394"/>
+            </a:xfrm>
+            <a:prstGeom prst="ellipse">
+              <a:avLst/>
+            </a:prstGeom>
+            <a:noFill/>
+            <a:ln>
+              <a:solidFill>
+                <a:schemeClr val="tx1"/>
+              </a:solidFill>
+            </a:ln>
+            <a:effectLst/>
+          </p:spPr>
+          <p:style>
+            <a:lnRef idx="2">
+              <a:schemeClr val="accent1">
+                <a:shade val="50000"/>
+              </a:schemeClr>
+            </a:lnRef>
+            <a:fillRef idx="1">
+              <a:schemeClr val="accent1"/>
+            </a:fillRef>
+            <a:effectRef idx="0">
+              <a:schemeClr val="accent1"/>
+            </a:effectRef>
+            <a:fontRef idx="minor">
+              <a:schemeClr val="lt1"/>
+            </a:fontRef>
+          </p:style>
+          <p:txBody>
+            <a:bodyPr rtlCol="0" anchor="ctr"/>
+            <a:lstStyle/>
+            <a:p>
+              <a:pPr algn="ctr"/>
+              <a:endParaRPr lang="en-US"/>
+            </a:p>
+          </p:txBody>
+        </p:sp>
+        <p:sp>
+          <p:nvSpPr>
+            <p:cNvPr id="178" name="Oval 177"/>
+            <p:cNvSpPr/>
+            <p:nvPr/>
+          </p:nvSpPr>
+          <p:spPr>
+            <a:xfrm>
+              <a:off x="4970714" y="4097520"/>
+              <a:ext cx="144394" cy="144394"/>
+            </a:xfrm>
+            <a:prstGeom prst="ellipse">
+              <a:avLst/>
+            </a:prstGeom>
+            <a:noFill/>
+            <a:ln>
+              <a:solidFill>
+                <a:schemeClr val="tx1"/>
+              </a:solidFill>
+            </a:ln>
+            <a:effectLst/>
+          </p:spPr>
+          <p:style>
+            <a:lnRef idx="2">
+              <a:schemeClr val="accent1">
+                <a:shade val="50000"/>
+              </a:schemeClr>
+            </a:lnRef>
+            <a:fillRef idx="1">
+              <a:schemeClr val="accent1"/>
+            </a:fillRef>
+            <a:effectRef idx="0">
+              <a:schemeClr val="accent1"/>
+            </a:effectRef>
+            <a:fontRef idx="minor">
+              <a:schemeClr val="lt1"/>
+            </a:fontRef>
+          </p:style>
+          <p:txBody>
+            <a:bodyPr rtlCol="0" anchor="ctr"/>
+            <a:lstStyle/>
+            <a:p>
+              <a:pPr algn="ctr"/>
+              <a:endParaRPr lang="en-US"/>
+            </a:p>
+          </p:txBody>
+        </p:sp>
+        <p:sp>
+          <p:nvSpPr>
+            <p:cNvPr id="179" name="Oval 178"/>
+            <p:cNvSpPr/>
+            <p:nvPr/>
+          </p:nvSpPr>
+          <p:spPr>
+            <a:xfrm>
+              <a:off x="4551614" y="4097520"/>
+              <a:ext cx="144394" cy="144394"/>
+            </a:xfrm>
+            <a:prstGeom prst="ellipse">
+              <a:avLst/>
+            </a:prstGeom>
+            <a:noFill/>
+            <a:ln>
+              <a:solidFill>
+                <a:schemeClr val="tx1"/>
+              </a:solidFill>
+            </a:ln>
+            <a:effectLst/>
+          </p:spPr>
+          <p:style>
+            <a:lnRef idx="2">
+              <a:schemeClr val="accent1">
+                <a:shade val="50000"/>
+              </a:schemeClr>
+            </a:lnRef>
+            <a:fillRef idx="1">
+              <a:schemeClr val="accent1"/>
+            </a:fillRef>
+            <a:effectRef idx="0">
+              <a:schemeClr val="accent1"/>
+            </a:effectRef>
+            <a:fontRef idx="minor">
+              <a:schemeClr val="lt1"/>
+            </a:fontRef>
+          </p:style>
+          <p:txBody>
+            <a:bodyPr rtlCol="0" anchor="ctr"/>
+            <a:lstStyle/>
+            <a:p>
+              <a:pPr algn="ctr"/>
+              <a:endParaRPr lang="en-US"/>
+            </a:p>
+          </p:txBody>
+        </p:sp>
+        <p:sp>
+          <p:nvSpPr>
+            <p:cNvPr id="180" name="Oval 179"/>
+            <p:cNvSpPr/>
+            <p:nvPr/>
+          </p:nvSpPr>
+          <p:spPr>
+            <a:xfrm>
+              <a:off x="4767514" y="3462520"/>
+              <a:ext cx="144394" cy="144394"/>
+            </a:xfrm>
+            <a:prstGeom prst="ellipse">
+              <a:avLst/>
+            </a:prstGeom>
+            <a:noFill/>
+            <a:ln>
+              <a:solidFill>
+                <a:schemeClr val="tx1"/>
+              </a:solidFill>
+            </a:ln>
+            <a:effectLst/>
+          </p:spPr>
+          <p:style>
+            <a:lnRef idx="2">
+              <a:schemeClr val="accent1">
+                <a:shade val="50000"/>
+              </a:schemeClr>
+            </a:lnRef>
+            <a:fillRef idx="1">
+              <a:schemeClr val="accent1"/>
+            </a:fillRef>
+            <a:effectRef idx="0">
+              <a:schemeClr val="accent1"/>
+            </a:effectRef>
+            <a:fontRef idx="minor">
+              <a:schemeClr val="lt1"/>
+            </a:fontRef>
+          </p:style>
+          <p:txBody>
+            <a:bodyPr rtlCol="0" anchor="ctr"/>
+            <a:lstStyle/>
+            <a:p>
+              <a:pPr algn="ctr"/>
+              <a:endParaRPr lang="en-US"/>
+            </a:p>
+          </p:txBody>
+        </p:sp>
+        <p:sp>
+          <p:nvSpPr>
+            <p:cNvPr id="181" name="Oval 180"/>
+            <p:cNvSpPr/>
+            <p:nvPr/>
+          </p:nvSpPr>
+          <p:spPr>
+            <a:xfrm>
+              <a:off x="6316914" y="3449820"/>
+              <a:ext cx="144394" cy="144394"/>
+            </a:xfrm>
+            <a:prstGeom prst="ellipse">
+              <a:avLst/>
+            </a:prstGeom>
+            <a:noFill/>
+            <a:ln>
+              <a:solidFill>
+                <a:schemeClr val="tx1"/>
+              </a:solidFill>
+            </a:ln>
+            <a:effectLst/>
+          </p:spPr>
+          <p:style>
+            <a:lnRef idx="2">
+              <a:schemeClr val="accent1">
+                <a:shade val="50000"/>
+              </a:schemeClr>
+            </a:lnRef>
+            <a:fillRef idx="1">
+              <a:schemeClr val="accent1"/>
+            </a:fillRef>
+            <a:effectRef idx="0">
+              <a:schemeClr val="accent1"/>
+            </a:effectRef>
+            <a:fontRef idx="minor">
+              <a:schemeClr val="lt1"/>
+            </a:fontRef>
+          </p:style>
+          <p:txBody>
+            <a:bodyPr rtlCol="0" anchor="ctr"/>
+            <a:lstStyle/>
+            <a:p>
+              <a:pPr algn="ctr"/>
+              <a:endParaRPr lang="en-US"/>
+            </a:p>
+          </p:txBody>
+        </p:sp>
+        <p:sp>
+          <p:nvSpPr>
+            <p:cNvPr id="182" name="Oval 181"/>
+            <p:cNvSpPr/>
+            <p:nvPr/>
+          </p:nvSpPr>
+          <p:spPr>
+            <a:xfrm>
+              <a:off x="6736014" y="3449820"/>
+              <a:ext cx="144394" cy="144394"/>
+            </a:xfrm>
+            <a:prstGeom prst="ellipse">
+              <a:avLst/>
+            </a:prstGeom>
+            <a:noFill/>
+            <a:ln>
+              <a:solidFill>
+                <a:schemeClr val="tx1"/>
+              </a:solidFill>
+            </a:ln>
+            <a:effectLst/>
+          </p:spPr>
+          <p:style>
+            <a:lnRef idx="2">
+              <a:schemeClr val="accent1">
+                <a:shade val="50000"/>
+              </a:schemeClr>
+            </a:lnRef>
+            <a:fillRef idx="1">
+              <a:schemeClr val="accent1"/>
+            </a:fillRef>
+            <a:effectRef idx="0">
+              <a:schemeClr val="accent1"/>
+            </a:effectRef>
+            <a:fontRef idx="minor">
+              <a:schemeClr val="lt1"/>
+            </a:fontRef>
+          </p:style>
+          <p:txBody>
+            <a:bodyPr rtlCol="0" anchor="ctr"/>
+            <a:lstStyle/>
+            <a:p>
+              <a:pPr algn="ctr"/>
+              <a:endParaRPr lang="en-US"/>
+            </a:p>
+          </p:txBody>
+        </p:sp>
+      </p:grpSp>
+      <p:sp>
+        <p:nvSpPr>
+          <p:cNvPr id="174" name="TextBox 173"/>
+          <p:cNvSpPr txBox="1"/>
+          <p:nvPr/>
+        </p:nvSpPr>
+        <p:spPr>
+          <a:xfrm>
+            <a:off x="571130" y="1080841"/>
+            <a:ext cx="436338" cy="369332"/>
+          </a:xfrm>
+          <a:prstGeom prst="rect">
+            <a:avLst/>
+          </a:prstGeom>
+          <a:noFill/>
+        </p:spPr>
+        <p:txBody>
+          <a:bodyPr wrap="none" rtlCol="0">
+            <a:spAutoFit/>
+          </a:bodyPr>
+          <a:lstStyle/>
+          <a:p>
+            <a:r>
+              <a:rPr lang="en-US" dirty="0"/>
+              <a:t>(a)</a:t>
+            </a:r>
+          </a:p>
+        </p:txBody>
+      </p:sp>
     </p:spTree>
     <p:extLst>
       <p:ext uri="{BB962C8B-B14F-4D97-AF65-F5344CB8AC3E}">
@@ -42729,9 +44452,10 @@
           <a:lstStyle/>
           <a:p>
             <a:r>
-              <a:rPr lang="en-US" dirty="0"/>
+              <a:rPr lang="en-US" dirty="0" smtClean="0"/>
               <a:t>(a)</a:t>
             </a:r>
+            <a:endParaRPr lang="en-US" dirty="0"/>
           </a:p>
         </p:txBody>
       </p:sp>
@@ -42758,9 +44482,10 @@
           <a:lstStyle/>
           <a:p>
             <a:r>
-              <a:rPr lang="en-US" dirty="0"/>
+              <a:rPr lang="en-US" dirty="0" smtClean="0"/>
               <a:t>(b)</a:t>
             </a:r>
+            <a:endParaRPr lang="en-US" dirty="0"/>
           </a:p>
         </p:txBody>
       </p:sp>
@@ -44531,7 +46256,7 @@
         </p:nvSpPr>
         <p:spPr>
           <a:xfrm>
-            <a:off x="8887074" y="2691825"/>
+            <a:off x="8403289" y="4003411"/>
             <a:ext cx="239168" cy="338554"/>
           </a:xfrm>
           <a:prstGeom prst="rect">
@@ -44861,7 +46586,251 @@
         </p:nvSpPr>
         <p:spPr>
           <a:xfrm>
-            <a:off x="8827952" y="1841836"/>
+            <a:off x="8860701" y="1867454"/>
+            <a:ext cx="300082" cy="338554"/>
+          </a:xfrm>
+          <a:prstGeom prst="rect">
+            <a:avLst/>
+          </a:prstGeom>
+          <a:noFill/>
+        </p:spPr>
+        <p:txBody>
+          <a:bodyPr wrap="none" rtlCol="0">
+            <a:spAutoFit/>
+          </a:bodyPr>
+          <a:lstStyle/>
+          <a:p>
+            <a:r>
+              <a:rPr lang="en-US" sz="1600" dirty="0">
+                <a:latin typeface="Apple Chancery" charset="0"/>
+                <a:ea typeface="Apple Chancery" charset="0"/>
+                <a:cs typeface="Apple Chancery" charset="0"/>
+              </a:rPr>
+              <a:t>2</a:t>
+            </a:r>
+            <a:endParaRPr lang="en-US" sz="1600" dirty="0">
+              <a:latin typeface="Apple Chancery" charset="0"/>
+              <a:ea typeface="Apple Chancery" charset="0"/>
+              <a:cs typeface="Apple Chancery" charset="0"/>
+            </a:endParaRPr>
+          </a:p>
+        </p:txBody>
+      </p:sp>
+      <p:cxnSp>
+        <p:nvCxnSpPr>
+          <p:cNvPr id="120" name="Straight Connector 119"/>
+          <p:cNvCxnSpPr/>
+          <p:nvPr/>
+        </p:nvCxnSpPr>
+        <p:spPr>
+          <a:xfrm flipV="1">
+            <a:off x="8133363" y="2074706"/>
+            <a:ext cx="215346" cy="629476"/>
+          </a:xfrm>
+          <a:prstGeom prst="line">
+            <a:avLst/>
+          </a:prstGeom>
+          <a:ln>
+            <a:solidFill>
+              <a:schemeClr val="tx1"/>
+            </a:solidFill>
+            <a:headEnd type="oval"/>
+            <a:tailEnd type="none"/>
+          </a:ln>
+        </p:spPr>
+        <p:style>
+          <a:lnRef idx="1">
+            <a:schemeClr val="accent1"/>
+          </a:lnRef>
+          <a:fillRef idx="0">
+            <a:schemeClr val="accent1"/>
+          </a:fillRef>
+          <a:effectRef idx="0">
+            <a:schemeClr val="accent1"/>
+          </a:effectRef>
+          <a:fontRef idx="minor">
+            <a:schemeClr val="tx1"/>
+          </a:fontRef>
+        </p:style>
+      </p:cxnSp>
+      <p:cxnSp>
+        <p:nvCxnSpPr>
+          <p:cNvPr id="121" name="Straight Connector 120"/>
+          <p:cNvCxnSpPr/>
+          <p:nvPr/>
+        </p:nvCxnSpPr>
+        <p:spPr>
+          <a:xfrm flipV="1">
+            <a:off x="8348709" y="1419307"/>
+            <a:ext cx="215346" cy="629476"/>
+          </a:xfrm>
+          <a:prstGeom prst="line">
+            <a:avLst/>
+          </a:prstGeom>
+          <a:ln>
+            <a:solidFill>
+              <a:schemeClr val="tx1"/>
+            </a:solidFill>
+            <a:headEnd type="diamond" w="lg" len="lg"/>
+            <a:tailEnd type="oval"/>
+          </a:ln>
+        </p:spPr>
+        <p:style>
+          <a:lnRef idx="1">
+            <a:schemeClr val="accent1"/>
+          </a:lnRef>
+          <a:fillRef idx="0">
+            <a:schemeClr val="accent1"/>
+          </a:fillRef>
+          <a:effectRef idx="0">
+            <a:schemeClr val="accent1"/>
+          </a:effectRef>
+          <a:fontRef idx="minor">
+            <a:schemeClr val="tx1"/>
+          </a:fontRef>
+        </p:style>
+      </p:cxnSp>
+      <p:cxnSp>
+        <p:nvCxnSpPr>
+          <p:cNvPr id="122" name="Straight Connector 121"/>
+          <p:cNvCxnSpPr/>
+          <p:nvPr/>
+        </p:nvCxnSpPr>
+        <p:spPr>
+          <a:xfrm flipH="1" flipV="1">
+            <a:off x="8564055" y="1419307"/>
+            <a:ext cx="215346" cy="629476"/>
+          </a:xfrm>
+          <a:prstGeom prst="line">
+            <a:avLst/>
+          </a:prstGeom>
+          <a:ln>
+            <a:solidFill>
+              <a:schemeClr val="tx1"/>
+            </a:solidFill>
+            <a:headEnd type="diamond" w="lg" len="lg"/>
+            <a:tailEnd type="none"/>
+          </a:ln>
+        </p:spPr>
+        <p:style>
+          <a:lnRef idx="1">
+            <a:schemeClr val="accent1"/>
+          </a:lnRef>
+          <a:fillRef idx="0">
+            <a:schemeClr val="accent1"/>
+          </a:fillRef>
+          <a:effectRef idx="0">
+            <a:schemeClr val="accent1"/>
+          </a:effectRef>
+          <a:fontRef idx="minor">
+            <a:schemeClr val="tx1"/>
+          </a:fontRef>
+        </p:style>
+      </p:cxnSp>
+      <p:cxnSp>
+        <p:nvCxnSpPr>
+          <p:cNvPr id="123" name="Straight Connector 122"/>
+          <p:cNvCxnSpPr/>
+          <p:nvPr/>
+        </p:nvCxnSpPr>
+        <p:spPr>
+          <a:xfrm flipH="1" flipV="1">
+            <a:off x="8779401" y="2036731"/>
+            <a:ext cx="215346" cy="629476"/>
+          </a:xfrm>
+          <a:prstGeom prst="line">
+            <a:avLst/>
+          </a:prstGeom>
+          <a:ln>
+            <a:solidFill>
+              <a:schemeClr val="tx1"/>
+            </a:solidFill>
+            <a:headEnd type="oval"/>
+            <a:tailEnd type="none"/>
+          </a:ln>
+        </p:spPr>
+        <p:style>
+          <a:lnRef idx="1">
+            <a:schemeClr val="accent1"/>
+          </a:lnRef>
+          <a:fillRef idx="0">
+            <a:schemeClr val="accent1"/>
+          </a:fillRef>
+          <a:effectRef idx="0">
+            <a:schemeClr val="accent1"/>
+          </a:effectRef>
+          <a:fontRef idx="minor">
+            <a:schemeClr val="tx1"/>
+          </a:fontRef>
+        </p:style>
+      </p:cxnSp>
+      <p:sp>
+        <p:nvSpPr>
+          <p:cNvPr id="125" name="TextBox 124"/>
+          <p:cNvSpPr txBox="1"/>
+          <p:nvPr/>
+        </p:nvSpPr>
+        <p:spPr>
+          <a:xfrm>
+            <a:off x="2162257" y="1181403"/>
+            <a:ext cx="436338" cy="369332"/>
+          </a:xfrm>
+          <a:prstGeom prst="rect">
+            <a:avLst/>
+          </a:prstGeom>
+          <a:noFill/>
+        </p:spPr>
+        <p:txBody>
+          <a:bodyPr wrap="none" rtlCol="0">
+            <a:spAutoFit/>
+          </a:bodyPr>
+          <a:lstStyle/>
+          <a:p>
+            <a:r>
+              <a:rPr lang="en-US" dirty="0"/>
+              <a:t>(a)</a:t>
+            </a:r>
+          </a:p>
+        </p:txBody>
+      </p:sp>
+      <p:sp>
+        <p:nvSpPr>
+          <p:cNvPr id="126" name="TextBox 125"/>
+          <p:cNvSpPr txBox="1"/>
+          <p:nvPr/>
+        </p:nvSpPr>
+        <p:spPr>
+          <a:xfrm>
+            <a:off x="7244438" y="1181403"/>
+            <a:ext cx="447558" cy="369332"/>
+          </a:xfrm>
+          <a:prstGeom prst="rect">
+            <a:avLst/>
+          </a:prstGeom>
+          <a:noFill/>
+        </p:spPr>
+        <p:txBody>
+          <a:bodyPr wrap="none" rtlCol="0">
+            <a:spAutoFit/>
+          </a:bodyPr>
+          <a:lstStyle/>
+          <a:p>
+            <a:r>
+              <a:rPr lang="en-US" dirty="0"/>
+              <a:t>(b)</a:t>
+            </a:r>
+          </a:p>
+        </p:txBody>
+      </p:sp>
+      <p:sp>
+        <p:nvSpPr>
+          <p:cNvPr id="74" name="TextBox 73"/>
+          <p:cNvSpPr txBox="1"/>
+          <p:nvPr/>
+        </p:nvSpPr>
+        <p:spPr>
+          <a:xfrm>
+            <a:off x="9060052" y="2493029"/>
             <a:ext cx="288862" cy="338554"/>
           </a:xfrm>
           <a:prstGeom prst="rect">
@@ -44888,13 +46857,13 @@
       </p:sp>
       <p:cxnSp>
         <p:nvCxnSpPr>
-          <p:cNvPr id="120" name="Straight Connector 119"/>
+          <p:cNvPr id="75" name="Straight Connector 74"/>
           <p:cNvCxnSpPr/>
           <p:nvPr/>
         </p:nvCxnSpPr>
         <p:spPr>
-          <a:xfrm flipV="1">
-            <a:off x="8133363" y="2074706"/>
+          <a:xfrm flipH="1" flipV="1">
+            <a:off x="8993053" y="2662306"/>
             <a:ext cx="215346" cy="629476"/>
           </a:xfrm>
           <a:prstGeom prst="line">
@@ -44925,13 +46894,13 @@
       </p:cxnSp>
       <p:cxnSp>
         <p:nvCxnSpPr>
-          <p:cNvPr id="121" name="Straight Connector 120"/>
+          <p:cNvPr id="76" name="Straight Connector 75"/>
           <p:cNvCxnSpPr/>
           <p:nvPr/>
         </p:nvCxnSpPr>
         <p:spPr>
           <a:xfrm flipV="1">
-            <a:off x="8348709" y="1419307"/>
+            <a:off x="8994747" y="3310479"/>
             <a:ext cx="215346" cy="629476"/>
           </a:xfrm>
           <a:prstGeom prst="line">
@@ -44941,8 +46910,8 @@
             <a:solidFill>
               <a:schemeClr val="tx1"/>
             </a:solidFill>
-            <a:headEnd type="diamond" w="lg" len="lg"/>
-            <a:tailEnd type="oval"/>
+            <a:headEnd type="oval"/>
+            <a:tailEnd type="none"/>
           </a:ln>
         </p:spPr>
         <p:style>
@@ -44962,13 +46931,13 @@
       </p:cxnSp>
       <p:cxnSp>
         <p:nvCxnSpPr>
-          <p:cNvPr id="122" name="Straight Connector 121"/>
+          <p:cNvPr id="77" name="Straight Connector 76"/>
           <p:cNvCxnSpPr/>
           <p:nvPr/>
         </p:nvCxnSpPr>
         <p:spPr>
           <a:xfrm flipH="1" flipV="1">
-            <a:off x="8564055" y="1419307"/>
+            <a:off x="9208399" y="3294566"/>
             <a:ext cx="215346" cy="629476"/>
           </a:xfrm>
           <a:prstGeom prst="line">
@@ -44978,7 +46947,7 @@
             <a:solidFill>
               <a:schemeClr val="tx1"/>
             </a:solidFill>
-            <a:headEnd type="diamond" w="lg" len="lg"/>
+            <a:headEnd type="oval"/>
             <a:tailEnd type="none"/>
           </a:ln>
         </p:spPr>
@@ -44999,13 +46968,13 @@
       </p:cxnSp>
       <p:cxnSp>
         <p:nvCxnSpPr>
-          <p:cNvPr id="123" name="Straight Connector 122"/>
+          <p:cNvPr id="79" name="Straight Connector 78"/>
           <p:cNvCxnSpPr/>
           <p:nvPr/>
         </p:nvCxnSpPr>
         <p:spPr>
-          <a:xfrm flipH="1" flipV="1">
-            <a:off x="8779401" y="2036731"/>
+          <a:xfrm flipV="1">
+            <a:off x="8564055" y="3326668"/>
             <a:ext cx="215346" cy="629476"/>
           </a:xfrm>
           <a:prstGeom prst="line">
@@ -45016,6 +46985,43 @@
               <a:schemeClr val="tx1"/>
             </a:solidFill>
             <a:headEnd type="oval"/>
+            <a:tailEnd type="none"/>
+          </a:ln>
+        </p:spPr>
+        <p:style>
+          <a:lnRef idx="1">
+            <a:schemeClr val="accent1"/>
+          </a:lnRef>
+          <a:fillRef idx="0">
+            <a:schemeClr val="accent1"/>
+          </a:fillRef>
+          <a:effectRef idx="0">
+            <a:schemeClr val="accent1"/>
+          </a:effectRef>
+          <a:fontRef idx="minor">
+            <a:schemeClr val="tx1"/>
+          </a:fontRef>
+        </p:style>
+      </p:cxnSp>
+      <p:cxnSp>
+        <p:nvCxnSpPr>
+          <p:cNvPr id="81" name="Straight Connector 80"/>
+          <p:cNvCxnSpPr/>
+          <p:nvPr/>
+        </p:nvCxnSpPr>
+        <p:spPr>
+          <a:xfrm flipV="1">
+            <a:off x="8779401" y="2676330"/>
+            <a:ext cx="215346" cy="629476"/>
+          </a:xfrm>
+          <a:prstGeom prst="line">
+            <a:avLst/>
+          </a:prstGeom>
+          <a:ln>
+            <a:solidFill>
+              <a:schemeClr val="tx1"/>
+            </a:solidFill>
+            <a:headEnd type="diamond" w="lg" len="lg"/>
             <a:tailEnd type="none"/>
           </a:ln>
         </p:spPr>
@@ -45036,14 +47042,14 @@
       </p:cxnSp>
       <p:sp>
         <p:nvSpPr>
-          <p:cNvPr id="125" name="TextBox 124"/>
+          <p:cNvPr id="82" name="TextBox 81"/>
           <p:cNvSpPr txBox="1"/>
           <p:nvPr/>
         </p:nvSpPr>
         <p:spPr>
           <a:xfrm>
-            <a:off x="2162257" y="1181403"/>
-            <a:ext cx="436338" cy="369332"/>
+            <a:off x="8823848" y="3975845"/>
+            <a:ext cx="346570" cy="338554"/>
           </a:xfrm>
           <a:prstGeom prst="rect">
             <a:avLst/>
@@ -45057,22 +47063,26 @@
           <a:lstStyle/>
           <a:p>
             <a:r>
-              <a:rPr lang="en-US" dirty="0"/>
-              <a:t>(a)</a:t>
+              <a:rPr lang="en-US" sz="1600" dirty="0">
+                <a:latin typeface="Apple Chancery" charset="0"/>
+                <a:ea typeface="Apple Chancery" charset="0"/>
+                <a:cs typeface="Apple Chancery" charset="0"/>
+              </a:rPr>
+              <a:t>m</a:t>
             </a:r>
           </a:p>
         </p:txBody>
       </p:sp>
       <p:sp>
         <p:nvSpPr>
-          <p:cNvPr id="126" name="TextBox 125"/>
+          <p:cNvPr id="83" name="TextBox 82"/>
           <p:cNvSpPr txBox="1"/>
           <p:nvPr/>
         </p:nvSpPr>
         <p:spPr>
           <a:xfrm>
-            <a:off x="7244438" y="1181403"/>
-            <a:ext cx="447558" cy="369332"/>
+            <a:off x="9286414" y="3939955"/>
+            <a:ext cx="300082" cy="338554"/>
           </a:xfrm>
           <a:prstGeom prst="rect">
             <a:avLst/>
@@ -45086,9 +47096,84 @@
           <a:lstStyle/>
           <a:p>
             <a:r>
-              <a:rPr lang="en-US" dirty="0"/>
-              <a:t>(b)</a:t>
+              <a:rPr lang="en-US" sz="1600" dirty="0">
+                <a:latin typeface="Apple Chancery" charset="0"/>
+                <a:ea typeface="Apple Chancery" charset="0"/>
+                <a:cs typeface="Apple Chancery" charset="0"/>
+              </a:rPr>
+              <a:t>n</a:t>
             </a:r>
+          </a:p>
+        </p:txBody>
+      </p:sp>
+      <p:sp>
+        <p:nvSpPr>
+          <p:cNvPr id="84" name="TextBox 83"/>
+          <p:cNvSpPr txBox="1"/>
+          <p:nvPr/>
+        </p:nvSpPr>
+        <p:spPr>
+          <a:xfrm>
+            <a:off x="8476753" y="3060868"/>
+            <a:ext cx="311304" cy="338554"/>
+          </a:xfrm>
+          <a:prstGeom prst="rect">
+            <a:avLst/>
+          </a:prstGeom>
+          <a:noFill/>
+        </p:spPr>
+        <p:txBody>
+          <a:bodyPr wrap="none" rtlCol="0">
+            <a:spAutoFit/>
+          </a:bodyPr>
+          <a:lstStyle/>
+          <a:p>
+            <a:r>
+              <a:rPr lang="en-US" sz="1600" dirty="0">
+                <a:latin typeface="Apple Chancery" charset="0"/>
+                <a:ea typeface="Apple Chancery" charset="0"/>
+                <a:cs typeface="Apple Chancery" charset="0"/>
+              </a:rPr>
+              <a:t>4</a:t>
+            </a:r>
+          </a:p>
+        </p:txBody>
+      </p:sp>
+      <p:sp>
+        <p:nvSpPr>
+          <p:cNvPr id="85" name="TextBox 84"/>
+          <p:cNvSpPr txBox="1"/>
+          <p:nvPr/>
+        </p:nvSpPr>
+        <p:spPr>
+          <a:xfrm>
+            <a:off x="9213353" y="3098968"/>
+            <a:ext cx="300082" cy="338554"/>
+          </a:xfrm>
+          <a:prstGeom prst="rect">
+            <a:avLst/>
+          </a:prstGeom>
+          <a:noFill/>
+        </p:spPr>
+        <p:txBody>
+          <a:bodyPr wrap="none" rtlCol="0">
+            <a:spAutoFit/>
+          </a:bodyPr>
+          <a:lstStyle/>
+          <a:p>
+            <a:r>
+              <a:rPr lang="en-US" sz="1600" dirty="0">
+                <a:latin typeface="Apple Chancery" charset="0"/>
+                <a:ea typeface="Apple Chancery" charset="0"/>
+                <a:cs typeface="Apple Chancery" charset="0"/>
+              </a:rPr>
+              <a:t>2</a:t>
+            </a:r>
+            <a:endParaRPr lang="en-US" sz="1600" dirty="0">
+              <a:latin typeface="Apple Chancery" charset="0"/>
+              <a:ea typeface="Apple Chancery" charset="0"/>
+              <a:cs typeface="Apple Chancery" charset="0"/>
+            </a:endParaRPr>
           </a:p>
         </p:txBody>
       </p:sp>

</xml_diff>